<commit_message>
Edited ppt, REORDERED part of genome
</commit_message>
<xml_diff>
--- a/presentation.pptx
+++ b/presentation.pptx
@@ -5,7 +5,7 @@
     <p:sldMasterId id="2147483660" r:id="rId1"/>
   </p:sldMasterIdLst>
   <p:notesMasterIdLst>
-    <p:notesMasterId r:id="rId13"/>
+    <p:notesMasterId r:id="rId15"/>
   </p:notesMasterIdLst>
   <p:sldIdLst>
     <p:sldId id="256" r:id="rId2"/>
@@ -13,12 +13,14 @@
     <p:sldId id="264" r:id="rId4"/>
     <p:sldId id="259" r:id="rId5"/>
     <p:sldId id="265" r:id="rId6"/>
-    <p:sldId id="260" r:id="rId7"/>
-    <p:sldId id="266" r:id="rId8"/>
-    <p:sldId id="261" r:id="rId9"/>
-    <p:sldId id="267" r:id="rId10"/>
-    <p:sldId id="262" r:id="rId11"/>
-    <p:sldId id="263" r:id="rId12"/>
+    <p:sldId id="268" r:id="rId7"/>
+    <p:sldId id="260" r:id="rId8"/>
+    <p:sldId id="266" r:id="rId9"/>
+    <p:sldId id="261" r:id="rId10"/>
+    <p:sldId id="267" r:id="rId11"/>
+    <p:sldId id="269" r:id="rId12"/>
+    <p:sldId id="262" r:id="rId13"/>
+    <p:sldId id="263" r:id="rId14"/>
   </p:sldIdLst>
   <p:sldSz cx="9144000" cy="6858000" type="screen4x3"/>
   <p:notesSz cx="6858000" cy="9144000"/>
@@ -117,6 +119,22 @@
       </a:defRPr>
     </a:lvl9pPr>
   </p:defaultTextStyle>
+  <p:extLst>
+    <p:ext uri="{EFAFB233-063F-42B5-8137-9DF3F51BA10A}">
+      <p15:sldGuideLst xmlns:p15="http://schemas.microsoft.com/office/powerpoint/2012/main">
+        <p15:guide id="1" orient="horz" pos="2160">
+          <p15:clr>
+            <a:srgbClr val="A4A3A4"/>
+          </p15:clr>
+        </p15:guide>
+        <p15:guide id="2" pos="2880">
+          <p15:clr>
+            <a:srgbClr val="A4A3A4"/>
+          </p15:clr>
+        </p15:guide>
+      </p15:sldGuideLst>
+    </p:ext>
+  </p:extLst>
 </p:presentation>
 </file>
 
@@ -202,7 +220,7 @@
           <a:p>
             <a:fld id="{44201544-D0D1-5B41-A16A-F722EC0150C2}" type="datetimeFigureOut">
               <a:rPr lang="en-US" smtClean="0"/>
-              <a:t>6/4/15</a:t>
+              <a:t>6/5/2015</a:t>
             </a:fld>
             <a:endParaRPr lang="en-US"/>
           </a:p>
@@ -833,7 +851,7 @@
           <a:p>
             <a:fld id="{1778F24D-EB19-4AE0-B015-2BEA6D5224F2}" type="datetimeFigureOut">
               <a:rPr lang="en-US" smtClean="0"/>
-              <a:t>6/4/15</a:t>
+              <a:t>6/5/2015</a:t>
             </a:fld>
             <a:endParaRPr lang="en-US"/>
           </a:p>
@@ -1146,7 +1164,7 @@
           <a:p>
             <a:fld id="{1778F24D-EB19-4AE0-B015-2BEA6D5224F2}" type="datetimeFigureOut">
               <a:rPr lang="en-US" smtClean="0"/>
-              <a:t>6/4/15</a:t>
+              <a:t>6/5/2015</a:t>
             </a:fld>
             <a:endParaRPr lang="en-US"/>
           </a:p>
@@ -1353,7 +1371,7 @@
           <a:p>
             <a:fld id="{1778F24D-EB19-4AE0-B015-2BEA6D5224F2}" type="datetimeFigureOut">
               <a:rPr lang="en-US" smtClean="0"/>
-              <a:t>6/4/15</a:t>
+              <a:t>6/5/2015</a:t>
             </a:fld>
             <a:endParaRPr lang="en-US"/>
           </a:p>
@@ -1558,7 +1576,7 @@
           <a:p>
             <a:fld id="{1778F24D-EB19-4AE0-B015-2BEA6D5224F2}" type="datetimeFigureOut">
               <a:rPr lang="en-US" smtClean="0"/>
-              <a:t>6/4/15</a:t>
+              <a:t>6/5/2015</a:t>
             </a:fld>
             <a:endParaRPr lang="en-US"/>
           </a:p>
@@ -1753,7 +1771,7 @@
           <a:p>
             <a:fld id="{1778F24D-EB19-4AE0-B015-2BEA6D5224F2}" type="datetimeFigureOut">
               <a:rPr lang="en-US" smtClean="0"/>
-              <a:t>6/4/15</a:t>
+              <a:t>6/5/2015</a:t>
             </a:fld>
             <a:endParaRPr lang="en-US"/>
           </a:p>
@@ -2023,7 +2041,7 @@
           <a:p>
             <a:fld id="{1778F24D-EB19-4AE0-B015-2BEA6D5224F2}" type="datetimeFigureOut">
               <a:rPr lang="en-US" smtClean="0"/>
-              <a:t>6/4/15</a:t>
+              <a:t>6/5/2015</a:t>
             </a:fld>
             <a:endParaRPr lang="en-US"/>
           </a:p>
@@ -2334,7 +2352,7 @@
           <a:p>
             <a:fld id="{1778F24D-EB19-4AE0-B015-2BEA6D5224F2}" type="datetimeFigureOut">
               <a:rPr lang="en-US" smtClean="0"/>
-              <a:t>6/4/15</a:t>
+              <a:t>6/5/2015</a:t>
             </a:fld>
             <a:endParaRPr lang="en-US"/>
           </a:p>
@@ -2795,7 +2813,7 @@
           <a:p>
             <a:fld id="{1778F24D-EB19-4AE0-B015-2BEA6D5224F2}" type="datetimeFigureOut">
               <a:rPr lang="en-US" smtClean="0"/>
-              <a:t>6/4/15</a:t>
+              <a:t>6/5/2015</a:t>
             </a:fld>
             <a:endParaRPr lang="en-US"/>
           </a:p>
@@ -2934,7 +2952,7 @@
           <a:p>
             <a:fld id="{1778F24D-EB19-4AE0-B015-2BEA6D5224F2}" type="datetimeFigureOut">
               <a:rPr lang="en-US" smtClean="0"/>
-              <a:t>6/4/15</a:t>
+              <a:t>6/5/2015</a:t>
             </a:fld>
             <a:endParaRPr lang="en-US"/>
           </a:p>
@@ -3050,7 +3068,7 @@
           <a:p>
             <a:fld id="{1778F24D-EB19-4AE0-B015-2BEA6D5224F2}" type="datetimeFigureOut">
               <a:rPr lang="en-US" smtClean="0"/>
-              <a:t>6/4/15</a:t>
+              <a:t>6/5/2015</a:t>
             </a:fld>
             <a:endParaRPr lang="en-US"/>
           </a:p>
@@ -3336,7 +3354,7 @@
           <a:p>
             <a:fld id="{1778F24D-EB19-4AE0-B015-2BEA6D5224F2}" type="datetimeFigureOut">
               <a:rPr lang="en-US" smtClean="0"/>
-              <a:t>6/4/15</a:t>
+              <a:t>6/5/2015</a:t>
             </a:fld>
             <a:endParaRPr lang="en-US"/>
           </a:p>
@@ -3674,7 +3692,7 @@
           <a:p>
             <a:fld id="{1778F24D-EB19-4AE0-B015-2BEA6D5224F2}" type="datetimeFigureOut">
               <a:rPr lang="en-US" smtClean="0"/>
-              <a:t>6/4/15</a:t>
+              <a:t>6/5/2015</a:t>
             </a:fld>
             <a:endParaRPr lang="en-US"/>
           </a:p>
@@ -3950,7 +3968,7 @@
           <a:p>
             <a:fld id="{1778F24D-EB19-4AE0-B015-2BEA6D5224F2}" type="datetimeFigureOut">
               <a:rPr lang="en-US" smtClean="0"/>
-              <a:t>6/4/15</a:t>
+              <a:t>6/5/2015</a:t>
             </a:fld>
             <a:endParaRPr lang="en-US"/>
           </a:p>
@@ -4577,6 +4595,684 @@
           <a:p>
             <a:r>
               <a:rPr lang="en-US" dirty="0" smtClean="0"/>
+              <a:t>How does it work?</a:t>
+            </a:r>
+            <a:endParaRPr lang="en-US" dirty="0"/>
+          </a:p>
+        </p:txBody>
+      </p:sp>
+      <p:sp>
+        <p:nvSpPr>
+          <p:cNvPr id="3" name="Content Placeholder 2"/>
+          <p:cNvSpPr>
+            <a:spLocks noGrp="1"/>
+          </p:cNvSpPr>
+          <p:nvPr>
+            <p:ph idx="1"/>
+          </p:nvPr>
+        </p:nvSpPr>
+        <p:spPr/>
+        <p:txBody>
+          <a:bodyPr numCol="1">
+            <a:normAutofit/>
+          </a:bodyPr>
+          <a:lstStyle/>
+          <a:p>
+            <a:pPr>
+              <a:spcBef>
+                <a:spcPts val="0"/>
+              </a:spcBef>
+            </a:pPr>
+            <a:r>
+              <a:rPr lang="en-US" dirty="0" smtClean="0"/>
+              <a:t>Representation</a:t>
+            </a:r>
+          </a:p>
+          <a:p>
+            <a:pPr lvl="1">
+              <a:spcBef>
+                <a:spcPts val="0"/>
+              </a:spcBef>
+            </a:pPr>
+            <a:r>
+              <a:rPr lang="en-US" dirty="0" smtClean="0"/>
+              <a:t>Genome</a:t>
+            </a:r>
+          </a:p>
+          <a:p>
+            <a:pPr lvl="2">
+              <a:spcBef>
+                <a:spcPts val="0"/>
+              </a:spcBef>
+            </a:pPr>
+            <a:r>
+              <a:rPr lang="en-US" sz="1600" dirty="0" smtClean="0"/>
+              <a:t>Virus</a:t>
+            </a:r>
+          </a:p>
+          <a:p>
+            <a:pPr lvl="2">
+              <a:spcBef>
+                <a:spcPts val="0"/>
+              </a:spcBef>
+            </a:pPr>
+            <a:endParaRPr lang="en-US" sz="1600" dirty="0"/>
+          </a:p>
+          <a:p>
+            <a:pPr lvl="2">
+              <a:spcBef>
+                <a:spcPts val="0"/>
+              </a:spcBef>
+            </a:pPr>
+            <a:endParaRPr lang="en-US" sz="1600" dirty="0" smtClean="0"/>
+          </a:p>
+          <a:p>
+            <a:pPr lvl="2">
+              <a:spcBef>
+                <a:spcPts val="0"/>
+              </a:spcBef>
+            </a:pPr>
+            <a:r>
+              <a:rPr lang="en-US" sz="1600" dirty="0" smtClean="0"/>
+              <a:t>Bacteria</a:t>
+            </a:r>
+            <a:endParaRPr lang="en-US" dirty="0" smtClean="0"/>
+          </a:p>
+        </p:txBody>
+      </p:sp>
+      <p:graphicFrame>
+        <p:nvGraphicFramePr>
+          <p:cNvPr id="4" name="Table 3"/>
+          <p:cNvGraphicFramePr>
+            <a:graphicFrameLocks noGrp="1"/>
+          </p:cNvGraphicFramePr>
+          <p:nvPr>
+            <p:extLst>
+              <p:ext uri="{D42A27DB-BD31-4B8C-83A1-F6EECF244321}">
+                <p14:modId xmlns:p14="http://schemas.microsoft.com/office/powerpoint/2010/main" val="167514128"/>
+              </p:ext>
+            </p:extLst>
+          </p:nvPr>
+        </p:nvGraphicFramePr>
+        <p:xfrm>
+          <a:off x="1668776" y="3256280"/>
+          <a:ext cx="6328416" cy="370840"/>
+        </p:xfrm>
+        <a:graphic>
+          <a:graphicData uri="http://schemas.openxmlformats.org/drawingml/2006/table">
+            <a:tbl>
+              <a:tblPr firstRow="1">
+                <a:tableStyleId>{5C22544A-7EE6-4342-B048-85BDC9FD1C3A}</a:tableStyleId>
+              </a:tblPr>
+              <a:tblGrid>
+                <a:gridCol w="2109472"/>
+                <a:gridCol w="2109472"/>
+                <a:gridCol w="527368"/>
+                <a:gridCol w="527368"/>
+                <a:gridCol w="527368"/>
+                <a:gridCol w="527368"/>
+              </a:tblGrid>
+              <a:tr h="370840">
+                <a:tc>
+                  <a:txBody>
+                    <a:bodyPr/>
+                    <a:lstStyle/>
+                    <a:p>
+                      <a:r>
+                        <a:rPr lang="en-US" dirty="0" smtClean="0"/>
+                        <a:t>Interaction Model</a:t>
+                      </a:r>
+                      <a:endParaRPr lang="en-US" dirty="0"/>
+                    </a:p>
+                  </a:txBody>
+                  <a:tcPr/>
+                </a:tc>
+                <a:tc>
+                  <a:txBody>
+                    <a:bodyPr/>
+                    <a:lstStyle/>
+                    <a:p>
+                      <a:r>
+                        <a:rPr lang="en-US" dirty="0" smtClean="0"/>
+                        <a:t>Mutation Rate</a:t>
+                      </a:r>
+                      <a:endParaRPr lang="en-US" dirty="0"/>
+                    </a:p>
+                  </a:txBody>
+                  <a:tcPr>
+                    <a:solidFill>
+                      <a:schemeClr val="accent6"/>
+                    </a:solidFill>
+                  </a:tcPr>
+                </a:tc>
+                <a:tc>
+                  <a:txBody>
+                    <a:bodyPr/>
+                    <a:lstStyle/>
+                    <a:p>
+                      <a:endParaRPr lang="en-US" dirty="0"/>
+                    </a:p>
+                  </a:txBody>
+                  <a:tcPr anchor="ctr" anchorCtr="1">
+                    <a:solidFill>
+                      <a:schemeClr val="accent4"/>
+                    </a:solidFill>
+                  </a:tcPr>
+                </a:tc>
+                <a:tc>
+                  <a:txBody>
+                    <a:bodyPr/>
+                    <a:lstStyle/>
+                    <a:p>
+                      <a:endParaRPr lang="en-US" dirty="0"/>
+                    </a:p>
+                  </a:txBody>
+                  <a:tcPr>
+                    <a:solidFill>
+                      <a:schemeClr val="accent4"/>
+                    </a:solidFill>
+                  </a:tcPr>
+                </a:tc>
+                <a:tc>
+                  <a:txBody>
+                    <a:bodyPr/>
+                    <a:lstStyle/>
+                    <a:p>
+                      <a:endParaRPr lang="en-US" dirty="0"/>
+                    </a:p>
+                  </a:txBody>
+                  <a:tcPr>
+                    <a:solidFill>
+                      <a:schemeClr val="accent4"/>
+                    </a:solidFill>
+                  </a:tcPr>
+                </a:tc>
+                <a:tc>
+                  <a:txBody>
+                    <a:bodyPr/>
+                    <a:lstStyle/>
+                    <a:p>
+                      <a:endParaRPr lang="en-US" dirty="0"/>
+                    </a:p>
+                  </a:txBody>
+                  <a:tcPr>
+                    <a:solidFill>
+                      <a:schemeClr val="accent4"/>
+                    </a:solidFill>
+                  </a:tcPr>
+                </a:tc>
+              </a:tr>
+            </a:tbl>
+          </a:graphicData>
+        </a:graphic>
+      </p:graphicFrame>
+      <p:sp>
+        <p:nvSpPr>
+          <p:cNvPr id="5" name="TextBox 4"/>
+          <p:cNvSpPr txBox="1"/>
+          <p:nvPr/>
+        </p:nvSpPr>
+        <p:spPr>
+          <a:xfrm>
+            <a:off x="5977890" y="3251200"/>
+            <a:ext cx="2019300" cy="370840"/>
+          </a:xfrm>
+          <a:prstGeom prst="rect">
+            <a:avLst/>
+          </a:prstGeom>
+          <a:noFill/>
+        </p:spPr>
+        <p:txBody>
+          <a:bodyPr wrap="square" rtlCol="0">
+            <a:spAutoFit/>
+          </a:bodyPr>
+          <a:lstStyle/>
+          <a:p>
+            <a:r>
+              <a:rPr lang="en-US" b="1" dirty="0" smtClean="0">
+                <a:solidFill>
+                  <a:schemeClr val="bg1"/>
+                </a:solidFill>
+              </a:rPr>
+              <a:t>Virulence</a:t>
+            </a:r>
+            <a:endParaRPr lang="en-US" b="1" dirty="0">
+              <a:solidFill>
+                <a:schemeClr val="bg1"/>
+              </a:solidFill>
+            </a:endParaRPr>
+          </a:p>
+        </p:txBody>
+      </p:sp>
+      <p:graphicFrame>
+        <p:nvGraphicFramePr>
+          <p:cNvPr id="7" name="Table 6"/>
+          <p:cNvGraphicFramePr>
+            <a:graphicFrameLocks noGrp="1"/>
+          </p:cNvGraphicFramePr>
+          <p:nvPr>
+            <p:extLst>
+              <p:ext uri="{D42A27DB-BD31-4B8C-83A1-F6EECF244321}">
+                <p14:modId xmlns:p14="http://schemas.microsoft.com/office/powerpoint/2010/main" val="3038073654"/>
+              </p:ext>
+            </p:extLst>
+          </p:nvPr>
+        </p:nvGraphicFramePr>
+        <p:xfrm>
+          <a:off x="1668776" y="4022164"/>
+          <a:ext cx="6328417" cy="370840"/>
+        </p:xfrm>
+        <a:graphic>
+          <a:graphicData uri="http://schemas.openxmlformats.org/drawingml/2006/table">
+            <a:tbl>
+              <a:tblPr firstRow="1">
+                <a:tableStyleId>{5C22544A-7EE6-4342-B048-85BDC9FD1C3A}</a:tableStyleId>
+              </a:tblPr>
+              <a:tblGrid>
+                <a:gridCol w="2068834"/>
+                <a:gridCol w="1680210"/>
+                <a:gridCol w="336369"/>
+                <a:gridCol w="336369"/>
+                <a:gridCol w="336369"/>
+                <a:gridCol w="336369"/>
+                <a:gridCol w="336369"/>
+                <a:gridCol w="336369"/>
+                <a:gridCol w="336369"/>
+                <a:gridCol w="224790"/>
+              </a:tblGrid>
+              <a:tr h="370840">
+                <a:tc>
+                  <a:txBody>
+                    <a:bodyPr/>
+                    <a:lstStyle/>
+                    <a:p>
+                      <a:r>
+                        <a:rPr lang="en-US" dirty="0" smtClean="0"/>
+                        <a:t>Interaction Model</a:t>
+                      </a:r>
+                      <a:endParaRPr lang="en-US" dirty="0"/>
+                    </a:p>
+                  </a:txBody>
+                  <a:tcPr/>
+                </a:tc>
+                <a:tc>
+                  <a:txBody>
+                    <a:bodyPr/>
+                    <a:lstStyle/>
+                    <a:p>
+                      <a:r>
+                        <a:rPr lang="en-US" dirty="0" smtClean="0"/>
+                        <a:t>Mutation Rate</a:t>
+                      </a:r>
+                      <a:endParaRPr lang="en-US" dirty="0"/>
+                    </a:p>
+                  </a:txBody>
+                  <a:tcPr>
+                    <a:solidFill>
+                      <a:schemeClr val="accent6"/>
+                    </a:solidFill>
+                  </a:tcPr>
+                </a:tc>
+                <a:tc>
+                  <a:txBody>
+                    <a:bodyPr/>
+                    <a:lstStyle/>
+                    <a:p>
+                      <a:endParaRPr lang="en-US" dirty="0"/>
+                    </a:p>
+                  </a:txBody>
+                  <a:tcPr anchor="ctr" anchorCtr="1">
+                    <a:solidFill>
+                      <a:schemeClr val="accent4"/>
+                    </a:solidFill>
+                  </a:tcPr>
+                </a:tc>
+                <a:tc>
+                  <a:txBody>
+                    <a:bodyPr/>
+                    <a:lstStyle/>
+                    <a:p>
+                      <a:endParaRPr lang="en-US" dirty="0"/>
+                    </a:p>
+                  </a:txBody>
+                  <a:tcPr>
+                    <a:solidFill>
+                      <a:schemeClr val="accent4"/>
+                    </a:solidFill>
+                  </a:tcPr>
+                </a:tc>
+                <a:tc>
+                  <a:txBody>
+                    <a:bodyPr/>
+                    <a:lstStyle/>
+                    <a:p>
+                      <a:endParaRPr lang="en-US" dirty="0"/>
+                    </a:p>
+                  </a:txBody>
+                  <a:tcPr>
+                    <a:solidFill>
+                      <a:schemeClr val="accent4"/>
+                    </a:solidFill>
+                  </a:tcPr>
+                </a:tc>
+                <a:tc>
+                  <a:txBody>
+                    <a:bodyPr/>
+                    <a:lstStyle/>
+                    <a:p>
+                      <a:endParaRPr lang="en-US" dirty="0"/>
+                    </a:p>
+                  </a:txBody>
+                  <a:tcPr anchor="ctr" anchorCtr="1">
+                    <a:solidFill>
+                      <a:schemeClr val="accent4"/>
+                    </a:solidFill>
+                  </a:tcPr>
+                </a:tc>
+                <a:tc>
+                  <a:txBody>
+                    <a:bodyPr/>
+                    <a:lstStyle/>
+                    <a:p>
+                      <a:endParaRPr lang="en-US" dirty="0"/>
+                    </a:p>
+                  </a:txBody>
+                  <a:tcPr>
+                    <a:solidFill>
+                      <a:schemeClr val="accent1">
+                        <a:lumMod val="40000"/>
+                        <a:lumOff val="60000"/>
+                      </a:schemeClr>
+                    </a:solidFill>
+                  </a:tcPr>
+                </a:tc>
+                <a:tc>
+                  <a:txBody>
+                    <a:bodyPr/>
+                    <a:lstStyle/>
+                    <a:p>
+                      <a:endParaRPr lang="en-US" dirty="0"/>
+                    </a:p>
+                  </a:txBody>
+                  <a:tcPr>
+                    <a:solidFill>
+                      <a:schemeClr val="accent1">
+                        <a:lumMod val="40000"/>
+                        <a:lumOff val="60000"/>
+                      </a:schemeClr>
+                    </a:solidFill>
+                  </a:tcPr>
+                </a:tc>
+                <a:tc>
+                  <a:txBody>
+                    <a:bodyPr/>
+                    <a:lstStyle/>
+                    <a:p>
+                      <a:endParaRPr lang="en-US" dirty="0"/>
+                    </a:p>
+                  </a:txBody>
+                  <a:tcPr>
+                    <a:solidFill>
+                      <a:schemeClr val="accent1">
+                        <a:lumMod val="40000"/>
+                        <a:lumOff val="60000"/>
+                      </a:schemeClr>
+                    </a:solidFill>
+                  </a:tcPr>
+                </a:tc>
+                <a:tc>
+                  <a:txBody>
+                    <a:bodyPr/>
+                    <a:lstStyle/>
+                    <a:p>
+                      <a:endParaRPr lang="en-US" dirty="0"/>
+                    </a:p>
+                  </a:txBody>
+                  <a:tcPr>
+                    <a:solidFill>
+                      <a:schemeClr val="accent1">
+                        <a:lumMod val="40000"/>
+                        <a:lumOff val="60000"/>
+                      </a:schemeClr>
+                    </a:solidFill>
+                  </a:tcPr>
+                </a:tc>
+              </a:tr>
+            </a:tbl>
+          </a:graphicData>
+        </a:graphic>
+      </p:graphicFrame>
+      <p:sp>
+        <p:nvSpPr>
+          <p:cNvPr id="8" name="TextBox 7"/>
+          <p:cNvSpPr txBox="1"/>
+          <p:nvPr/>
+        </p:nvSpPr>
+        <p:spPr>
+          <a:xfrm>
+            <a:off x="5453700" y="4022164"/>
+            <a:ext cx="1497330" cy="369332"/>
+          </a:xfrm>
+          <a:prstGeom prst="rect">
+            <a:avLst/>
+          </a:prstGeom>
+          <a:noFill/>
+        </p:spPr>
+        <p:txBody>
+          <a:bodyPr wrap="square" rtlCol="0">
+            <a:spAutoFit/>
+          </a:bodyPr>
+          <a:lstStyle/>
+          <a:p>
+            <a:r>
+              <a:rPr lang="en-US" b="1" dirty="0" smtClean="0">
+                <a:solidFill>
+                  <a:schemeClr val="bg1">
+                    <a:lumMod val="95000"/>
+                  </a:schemeClr>
+                </a:solidFill>
+              </a:rPr>
+              <a:t>Resistance</a:t>
+            </a:r>
+            <a:endParaRPr lang="en-US" b="1" dirty="0">
+              <a:solidFill>
+                <a:schemeClr val="bg1">
+                  <a:lumMod val="95000"/>
+                </a:schemeClr>
+              </a:solidFill>
+            </a:endParaRPr>
+          </a:p>
+        </p:txBody>
+      </p:sp>
+      <p:sp>
+        <p:nvSpPr>
+          <p:cNvPr id="9" name="TextBox 8"/>
+          <p:cNvSpPr txBox="1"/>
+          <p:nvPr/>
+        </p:nvSpPr>
+        <p:spPr>
+          <a:xfrm>
+            <a:off x="6697980" y="4020968"/>
+            <a:ext cx="1299213" cy="369332"/>
+          </a:xfrm>
+          <a:prstGeom prst="rect">
+            <a:avLst/>
+          </a:prstGeom>
+          <a:noFill/>
+        </p:spPr>
+        <p:txBody>
+          <a:bodyPr wrap="square" rtlCol="0">
+            <a:spAutoFit/>
+          </a:bodyPr>
+          <a:lstStyle/>
+          <a:p>
+            <a:r>
+              <a:rPr lang="en-US" b="1" dirty="0" smtClean="0">
+                <a:solidFill>
+                  <a:schemeClr val="bg1">
+                    <a:lumMod val="95000"/>
+                  </a:schemeClr>
+                </a:solidFill>
+              </a:rPr>
+              <a:t>Viability </a:t>
+            </a:r>
+            <a:endParaRPr lang="en-US" b="1" dirty="0">
+              <a:solidFill>
+                <a:schemeClr val="bg1">
+                  <a:lumMod val="95000"/>
+                </a:schemeClr>
+              </a:solidFill>
+            </a:endParaRPr>
+          </a:p>
+        </p:txBody>
+      </p:sp>
+    </p:spTree>
+    <p:extLst>
+      <p:ext uri="{BB962C8B-B14F-4D97-AF65-F5344CB8AC3E}">
+        <p14:creationId xmlns:p14="http://schemas.microsoft.com/office/powerpoint/2010/main" val="615378970"/>
+      </p:ext>
+    </p:extLst>
+  </p:cSld>
+  <p:clrMapOvr>
+    <a:masterClrMapping/>
+  </p:clrMapOvr>
+</p:sld>
+</file>
+
+<file path=ppt/slides/slide11.xml><?xml version="1.0" encoding="utf-8"?>
+<p:sld xmlns:a="http://schemas.openxmlformats.org/drawingml/2006/main" xmlns:r="http://schemas.openxmlformats.org/officeDocument/2006/relationships" xmlns:p="http://schemas.openxmlformats.org/presentationml/2006/main">
+  <p:cSld>
+    <p:spTree>
+      <p:nvGrpSpPr>
+        <p:cNvPr id="1" name=""/>
+        <p:cNvGrpSpPr/>
+        <p:nvPr/>
+      </p:nvGrpSpPr>
+      <p:grpSpPr>
+        <a:xfrm>
+          <a:off x="0" y="0"/>
+          <a:ext cx="0" cy="0"/>
+          <a:chOff x="0" y="0"/>
+          <a:chExt cx="0" cy="0"/>
+        </a:xfrm>
+      </p:grpSpPr>
+      <p:sp>
+        <p:nvSpPr>
+          <p:cNvPr id="2" name="Title 1"/>
+          <p:cNvSpPr>
+            <a:spLocks noGrp="1"/>
+          </p:cNvSpPr>
+          <p:nvPr>
+            <p:ph type="title"/>
+          </p:nvPr>
+        </p:nvSpPr>
+        <p:spPr/>
+        <p:txBody>
+          <a:bodyPr/>
+          <a:lstStyle/>
+          <a:p>
+            <a:r>
+              <a:rPr lang="en-US" dirty="0" smtClean="0"/>
+              <a:t>How does it work?</a:t>
+            </a:r>
+            <a:endParaRPr lang="en-US" dirty="0"/>
+          </a:p>
+        </p:txBody>
+      </p:sp>
+      <p:sp>
+        <p:nvSpPr>
+          <p:cNvPr id="3" name="Content Placeholder 2"/>
+          <p:cNvSpPr>
+            <a:spLocks noGrp="1"/>
+          </p:cNvSpPr>
+          <p:nvPr>
+            <p:ph idx="1"/>
+          </p:nvPr>
+        </p:nvSpPr>
+        <p:spPr/>
+        <p:txBody>
+          <a:bodyPr>
+            <a:normAutofit/>
+          </a:bodyPr>
+          <a:lstStyle/>
+          <a:p>
+            <a:r>
+              <a:rPr lang="en-US" dirty="0" smtClean="0"/>
+              <a:t>No </a:t>
+            </a:r>
+            <a:r>
+              <a:rPr lang="en-US" dirty="0" smtClean="0"/>
+              <a:t>crossover (both reproduce asexually in nature)</a:t>
+            </a:r>
+          </a:p>
+          <a:p>
+            <a:r>
+              <a:rPr lang="en-US" dirty="0" smtClean="0"/>
+              <a:t>Mutation rate?</a:t>
+            </a:r>
+          </a:p>
+          <a:p>
+            <a:r>
+              <a:rPr lang="en-US" dirty="0" smtClean="0"/>
+              <a:t>Fitness functions?</a:t>
+            </a:r>
+          </a:p>
+          <a:p>
+            <a:r>
+              <a:rPr lang="en-US" dirty="0" smtClean="0"/>
+              <a:t>Selection?</a:t>
+            </a:r>
+            <a:endParaRPr lang="en-US" dirty="0"/>
+          </a:p>
+        </p:txBody>
+      </p:sp>
+    </p:spTree>
+    <p:extLst>
+      <p:ext uri="{BB962C8B-B14F-4D97-AF65-F5344CB8AC3E}">
+        <p14:creationId xmlns:p14="http://schemas.microsoft.com/office/powerpoint/2010/main" val="2952753790"/>
+      </p:ext>
+    </p:extLst>
+  </p:cSld>
+  <p:clrMapOvr>
+    <a:masterClrMapping/>
+  </p:clrMapOvr>
+</p:sld>
+</file>
+
+<file path=ppt/slides/slide12.xml><?xml version="1.0" encoding="utf-8"?>
+<p:sld xmlns:a="http://schemas.openxmlformats.org/drawingml/2006/main" xmlns:r="http://schemas.openxmlformats.org/officeDocument/2006/relationships" xmlns:p="http://schemas.openxmlformats.org/presentationml/2006/main">
+  <p:cSld>
+    <p:spTree>
+      <p:nvGrpSpPr>
+        <p:cNvPr id="1" name=""/>
+        <p:cNvGrpSpPr/>
+        <p:nvPr/>
+      </p:nvGrpSpPr>
+      <p:grpSpPr>
+        <a:xfrm>
+          <a:off x="0" y="0"/>
+          <a:ext cx="0" cy="0"/>
+          <a:chOff x="0" y="0"/>
+          <a:chExt cx="0" cy="0"/>
+        </a:xfrm>
+      </p:grpSpPr>
+      <p:sp>
+        <p:nvSpPr>
+          <p:cNvPr id="2" name="Title 1"/>
+          <p:cNvSpPr>
+            <a:spLocks noGrp="1"/>
+          </p:cNvSpPr>
+          <p:nvPr>
+            <p:ph type="title"/>
+          </p:nvPr>
+        </p:nvSpPr>
+        <p:spPr/>
+        <p:txBody>
+          <a:bodyPr/>
+          <a:lstStyle/>
+          <a:p>
+            <a:r>
+              <a:rPr lang="en-US" dirty="0" smtClean="0"/>
               <a:t>Any interesting results?</a:t>
             </a:r>
             <a:endParaRPr lang="en-US" dirty="0"/>
@@ -4618,7 +5314,7 @@
 </p:sld>
 </file>
 
-<file path=ppt/slides/slide11.xml><?xml version="1.0" encoding="utf-8"?>
+<file path=ppt/slides/slide13.xml><?xml version="1.0" encoding="utf-8"?>
 <p:sld xmlns:a="http://schemas.openxmlformats.org/drawingml/2006/main" xmlns:r="http://schemas.openxmlformats.org/officeDocument/2006/relationships" xmlns:p="http://schemas.openxmlformats.org/presentationml/2006/main">
   <p:cSld>
     <p:spTree>
@@ -5089,11 +5785,7 @@
           <a:p>
             <a:r>
               <a:rPr lang="en-US" dirty="0" smtClean="0"/>
-              <a:t>Gene-for-Gene </a:t>
-            </a:r>
-            <a:r>
-              <a:rPr lang="en-US" dirty="0" smtClean="0"/>
-              <a:t>Interaction</a:t>
+              <a:t>Gene-for-Gene Interaction</a:t>
             </a:r>
             <a:endParaRPr lang="en-US" dirty="0"/>
           </a:p>
@@ -5196,245 +5888,13 @@
       </p:grpSpPr>
       <p:sp>
         <p:nvSpPr>
-          <p:cNvPr id="2" name="Title 1"/>
-          <p:cNvSpPr>
-            <a:spLocks noGrp="1"/>
-          </p:cNvSpPr>
-          <p:nvPr>
-            <p:ph type="title"/>
-          </p:nvPr>
-        </p:nvSpPr>
-        <p:spPr/>
-        <p:txBody>
-          <a:bodyPr/>
-          <a:lstStyle/>
-          <a:p>
-            <a:r>
-              <a:rPr lang="en-US" dirty="0" smtClean="0"/>
-              <a:t>For example….</a:t>
-            </a:r>
-            <a:endParaRPr lang="en-US" dirty="0"/>
-          </a:p>
-        </p:txBody>
-      </p:sp>
-      <p:sp>
-        <p:nvSpPr>
-          <p:cNvPr id="3" name="Content Placeholder 2"/>
-          <p:cNvSpPr>
-            <a:spLocks noGrp="1"/>
-          </p:cNvSpPr>
-          <p:nvPr>
-            <p:ph idx="1"/>
-          </p:nvPr>
-        </p:nvSpPr>
-        <p:spPr>
-          <a:xfrm>
-            <a:off x="1073829" y="3617166"/>
-            <a:ext cx="4575091" cy="546424"/>
-          </a:xfrm>
-        </p:spPr>
-        <p:txBody>
-          <a:bodyPr>
-            <a:noAutofit/>
-          </a:bodyPr>
-          <a:lstStyle/>
-          <a:p>
-            <a:pPr marL="0" indent="0">
-              <a:buNone/>
-            </a:pPr>
-            <a:r>
-              <a:rPr lang="en-US" sz="1800" dirty="0" smtClean="0"/>
-              <a:t>The bacteria can resist this virus, because it has a resistance gene for every protein.</a:t>
-            </a:r>
-            <a:endParaRPr lang="en-US" sz="1800" dirty="0"/>
-          </a:p>
-        </p:txBody>
-      </p:sp>
-      <p:sp>
-        <p:nvSpPr>
-          <p:cNvPr id="4" name="TextBox 3"/>
+          <p:cNvPr id="11" name="TextBox 10"/>
           <p:cNvSpPr txBox="1"/>
           <p:nvPr/>
         </p:nvSpPr>
         <p:spPr>
           <a:xfrm>
-            <a:off x="3729310" y="2620561"/>
-            <a:ext cx="1465966" cy="523220"/>
-          </a:xfrm>
-          <a:prstGeom prst="rect">
-            <a:avLst/>
-          </a:prstGeom>
-          <a:noFill/>
-        </p:spPr>
-        <p:txBody>
-          <a:bodyPr wrap="none" rtlCol="0">
-            <a:spAutoFit/>
-          </a:bodyPr>
-          <a:lstStyle/>
-          <a:p>
-            <a:pPr algn="ctr"/>
-            <a:r>
-              <a:rPr lang="en-US" sz="2800" b="1" dirty="0" smtClean="0">
-                <a:solidFill>
-                  <a:srgbClr val="FF0000"/>
-                </a:solidFill>
-              </a:rPr>
-              <a:t>0100011</a:t>
-            </a:r>
-            <a:endParaRPr lang="en-US" sz="2800" b="1" dirty="0">
-              <a:solidFill>
-                <a:srgbClr val="FF0000"/>
-              </a:solidFill>
-            </a:endParaRPr>
-          </a:p>
-        </p:txBody>
-      </p:sp>
-      <p:sp>
-        <p:nvSpPr>
-          <p:cNvPr id="5" name="TextBox 4"/>
-          <p:cNvSpPr txBox="1"/>
-          <p:nvPr/>
-        </p:nvSpPr>
-        <p:spPr>
-          <a:xfrm>
-            <a:off x="6523554" y="3640370"/>
-            <a:ext cx="1465966" cy="523220"/>
-          </a:xfrm>
-          <a:prstGeom prst="rect">
-            <a:avLst/>
-          </a:prstGeom>
-          <a:noFill/>
-        </p:spPr>
-        <p:txBody>
-          <a:bodyPr wrap="none" rtlCol="0">
-            <a:spAutoFit/>
-          </a:bodyPr>
-          <a:lstStyle/>
-          <a:p>
-            <a:r>
-              <a:rPr lang="en-US" sz="2800" b="1" dirty="0" smtClean="0">
-                <a:solidFill>
-                  <a:srgbClr val="008000"/>
-                </a:solidFill>
-              </a:rPr>
-              <a:t>0100001</a:t>
-            </a:r>
-            <a:endParaRPr lang="en-US" sz="2800" b="1" dirty="0">
-              <a:solidFill>
-                <a:srgbClr val="008000"/>
-              </a:solidFill>
-            </a:endParaRPr>
-          </a:p>
-        </p:txBody>
-      </p:sp>
-      <p:sp>
-        <p:nvSpPr>
-          <p:cNvPr id="6" name="TextBox 5"/>
-          <p:cNvSpPr txBox="1"/>
-          <p:nvPr/>
-        </p:nvSpPr>
-        <p:spPr>
-          <a:xfrm>
-            <a:off x="3965570" y="2373468"/>
-            <a:ext cx="1005403" cy="369332"/>
-          </a:xfrm>
-          <a:prstGeom prst="rect">
-            <a:avLst/>
-          </a:prstGeom>
-          <a:noFill/>
-        </p:spPr>
-        <p:txBody>
-          <a:bodyPr wrap="none" rtlCol="0">
-            <a:spAutoFit/>
-          </a:bodyPr>
-          <a:lstStyle/>
-          <a:p>
-            <a:pPr algn="ctr"/>
-            <a:r>
-              <a:rPr lang="en-US" dirty="0" smtClean="0"/>
-              <a:t>Bacteria</a:t>
-            </a:r>
-            <a:endParaRPr lang="en-US" dirty="0"/>
-          </a:p>
-        </p:txBody>
-      </p:sp>
-      <p:sp>
-        <p:nvSpPr>
-          <p:cNvPr id="8" name="TextBox 7"/>
-          <p:cNvSpPr txBox="1"/>
-          <p:nvPr/>
-        </p:nvSpPr>
-        <p:spPr>
-          <a:xfrm>
-            <a:off x="1073829" y="4567612"/>
-            <a:ext cx="5218407" cy="646331"/>
-          </a:xfrm>
-          <a:prstGeom prst="rect">
-            <a:avLst/>
-          </a:prstGeom>
-          <a:noFill/>
-        </p:spPr>
-        <p:txBody>
-          <a:bodyPr wrap="square" rtlCol="0">
-            <a:spAutoFit/>
-          </a:bodyPr>
-          <a:lstStyle/>
-          <a:p>
-            <a:r>
-              <a:rPr lang="en-US" dirty="0" smtClean="0"/>
-              <a:t>It cannot resist this virus, as the virus has a protein the bacteria doesn’t recognize.</a:t>
-            </a:r>
-            <a:endParaRPr lang="en-US" dirty="0"/>
-          </a:p>
-        </p:txBody>
-      </p:sp>
-      <p:sp>
-        <p:nvSpPr>
-          <p:cNvPr id="9" name="TextBox 8"/>
-          <p:cNvSpPr txBox="1"/>
-          <p:nvPr/>
-        </p:nvSpPr>
-        <p:spPr>
-          <a:xfrm>
-            <a:off x="6523554" y="4627440"/>
-            <a:ext cx="1465966" cy="523220"/>
-          </a:xfrm>
-          <a:prstGeom prst="rect">
-            <a:avLst/>
-          </a:prstGeom>
-          <a:noFill/>
-        </p:spPr>
-        <p:txBody>
-          <a:bodyPr wrap="none" rtlCol="0">
-            <a:spAutoFit/>
-          </a:bodyPr>
-          <a:lstStyle/>
-          <a:p>
-            <a:r>
-              <a:rPr lang="en-US" sz="2800" b="1" dirty="0" smtClean="0">
-                <a:solidFill>
-                  <a:srgbClr val="008000"/>
-                </a:solidFill>
-              </a:rPr>
-              <a:t>0100100</a:t>
-            </a:r>
-            <a:endParaRPr lang="en-US" sz="2800" b="1" dirty="0">
-              <a:solidFill>
-                <a:srgbClr val="008000"/>
-              </a:solidFill>
-            </a:endParaRPr>
-          </a:p>
-        </p:txBody>
-      </p:sp>
-      <p:sp>
-        <p:nvSpPr>
-          <p:cNvPr id="10" name="TextBox 9"/>
-          <p:cNvSpPr txBox="1"/>
-          <p:nvPr/>
-        </p:nvSpPr>
-        <p:spPr>
-          <a:xfrm>
-            <a:off x="685800" y="3455768"/>
+            <a:off x="685800" y="4398848"/>
             <a:ext cx="7450403" cy="923330"/>
           </a:xfrm>
           <a:prstGeom prst="rect">
@@ -5459,19 +5919,19 @@
             <a:endParaRPr lang="en-US" dirty="0"/>
           </a:p>
           <a:p>
-            <a:endParaRPr lang="en-US" dirty="0" smtClean="0"/>
-          </a:p>
-        </p:txBody>
-      </p:sp>
-      <p:sp>
-        <p:nvSpPr>
-          <p:cNvPr id="11" name="TextBox 10"/>
+            <a:endParaRPr lang="en-US" dirty="0"/>
+          </a:p>
+        </p:txBody>
+      </p:sp>
+      <p:sp>
+        <p:nvSpPr>
+          <p:cNvPr id="10" name="TextBox 9"/>
           <p:cNvSpPr txBox="1"/>
           <p:nvPr/>
         </p:nvSpPr>
         <p:spPr>
           <a:xfrm>
-            <a:off x="685800" y="4398848"/>
+            <a:off x="685800" y="3455768"/>
             <a:ext cx="7450403" cy="923330"/>
           </a:xfrm>
           <a:prstGeom prst="rect">
@@ -5496,10 +5956,314 @@
             <a:endParaRPr lang="en-US" dirty="0"/>
           </a:p>
           <a:p>
+            <a:endParaRPr lang="en-US" dirty="0" smtClean="0"/>
+          </a:p>
+        </p:txBody>
+      </p:sp>
+      <p:sp>
+        <p:nvSpPr>
+          <p:cNvPr id="2" name="Title 1"/>
+          <p:cNvSpPr>
+            <a:spLocks noGrp="1"/>
+          </p:cNvSpPr>
+          <p:nvPr>
+            <p:ph type="title"/>
+          </p:nvPr>
+        </p:nvSpPr>
+        <p:spPr/>
+        <p:txBody>
+          <a:bodyPr/>
+          <a:lstStyle/>
+          <a:p>
+            <a:r>
+              <a:rPr lang="en-US" dirty="0" smtClean="0"/>
+              <a:t>For example….</a:t>
+            </a:r>
             <a:endParaRPr lang="en-US" dirty="0"/>
           </a:p>
         </p:txBody>
       </p:sp>
+      <p:sp>
+        <p:nvSpPr>
+          <p:cNvPr id="3" name="Content Placeholder 2"/>
+          <p:cNvSpPr>
+            <a:spLocks noGrp="1"/>
+          </p:cNvSpPr>
+          <p:nvPr>
+            <p:ph idx="1"/>
+          </p:nvPr>
+        </p:nvSpPr>
+        <p:spPr>
+          <a:xfrm>
+            <a:off x="685800" y="3628768"/>
+            <a:ext cx="4575091" cy="546424"/>
+          </a:xfrm>
+        </p:spPr>
+        <p:txBody>
+          <a:bodyPr>
+            <a:noAutofit/>
+          </a:bodyPr>
+          <a:lstStyle/>
+          <a:p>
+            <a:pPr marL="0" indent="0">
+              <a:buNone/>
+            </a:pPr>
+            <a:r>
+              <a:rPr lang="en-US" sz="1800" dirty="0" smtClean="0"/>
+              <a:t>The bacteria can resist this virus, because it has a resistance gene for every protein.</a:t>
+            </a:r>
+            <a:endParaRPr lang="en-US" sz="1800" dirty="0"/>
+          </a:p>
+        </p:txBody>
+      </p:sp>
+      <p:sp>
+        <p:nvSpPr>
+          <p:cNvPr id="4" name="TextBox 3"/>
+          <p:cNvSpPr txBox="1"/>
+          <p:nvPr/>
+        </p:nvSpPr>
+        <p:spPr>
+          <a:xfrm>
+            <a:off x="3729310" y="2620561"/>
+            <a:ext cx="1465966" cy="523220"/>
+          </a:xfrm>
+          <a:prstGeom prst="rect">
+            <a:avLst/>
+          </a:prstGeom>
+          <a:noFill/>
+        </p:spPr>
+        <p:txBody>
+          <a:bodyPr wrap="none" rtlCol="0">
+            <a:spAutoFit/>
+          </a:bodyPr>
+          <a:lstStyle/>
+          <a:p>
+            <a:pPr algn="ctr"/>
+            <a:r>
+              <a:rPr lang="en-US" sz="2800" b="1" dirty="0" smtClean="0">
+                <a:solidFill>
+                  <a:srgbClr val="FF0000"/>
+                </a:solidFill>
+              </a:rPr>
+              <a:t>0100011</a:t>
+            </a:r>
+            <a:endParaRPr lang="en-US" sz="2800" b="1" dirty="0">
+              <a:solidFill>
+                <a:srgbClr val="FF0000"/>
+              </a:solidFill>
+            </a:endParaRPr>
+          </a:p>
+        </p:txBody>
+      </p:sp>
+      <p:sp>
+        <p:nvSpPr>
+          <p:cNvPr id="5" name="TextBox 4"/>
+          <p:cNvSpPr txBox="1"/>
+          <p:nvPr/>
+        </p:nvSpPr>
+        <p:spPr>
+          <a:xfrm>
+            <a:off x="6523554" y="3640370"/>
+            <a:ext cx="1465966" cy="523220"/>
+          </a:xfrm>
+          <a:prstGeom prst="rect">
+            <a:avLst/>
+          </a:prstGeom>
+          <a:noFill/>
+        </p:spPr>
+        <p:txBody>
+          <a:bodyPr wrap="none" rtlCol="0">
+            <a:spAutoFit/>
+          </a:bodyPr>
+          <a:lstStyle/>
+          <a:p>
+            <a:r>
+              <a:rPr lang="en-US" sz="2800" b="1" dirty="0" smtClean="0">
+                <a:solidFill>
+                  <a:srgbClr val="008000"/>
+                </a:solidFill>
+              </a:rPr>
+              <a:t>0100001</a:t>
+            </a:r>
+            <a:endParaRPr lang="en-US" sz="2800" b="1" dirty="0">
+              <a:solidFill>
+                <a:srgbClr val="008000"/>
+              </a:solidFill>
+            </a:endParaRPr>
+          </a:p>
+        </p:txBody>
+      </p:sp>
+      <p:sp>
+        <p:nvSpPr>
+          <p:cNvPr id="6" name="TextBox 5"/>
+          <p:cNvSpPr txBox="1"/>
+          <p:nvPr/>
+        </p:nvSpPr>
+        <p:spPr>
+          <a:xfrm>
+            <a:off x="3965570" y="2373468"/>
+            <a:ext cx="1005403" cy="369332"/>
+          </a:xfrm>
+          <a:prstGeom prst="rect">
+            <a:avLst/>
+          </a:prstGeom>
+          <a:noFill/>
+        </p:spPr>
+        <p:txBody>
+          <a:bodyPr wrap="none" rtlCol="0">
+            <a:spAutoFit/>
+          </a:bodyPr>
+          <a:lstStyle/>
+          <a:p>
+            <a:pPr algn="ctr"/>
+            <a:r>
+              <a:rPr lang="en-US" dirty="0" smtClean="0"/>
+              <a:t>Bacteria</a:t>
+            </a:r>
+            <a:endParaRPr lang="en-US" dirty="0"/>
+          </a:p>
+        </p:txBody>
+      </p:sp>
+      <p:sp>
+        <p:nvSpPr>
+          <p:cNvPr id="8" name="TextBox 7"/>
+          <p:cNvSpPr txBox="1"/>
+          <p:nvPr/>
+        </p:nvSpPr>
+        <p:spPr>
+          <a:xfrm>
+            <a:off x="685800" y="4552098"/>
+            <a:ext cx="5218407" cy="646331"/>
+          </a:xfrm>
+          <a:prstGeom prst="rect">
+            <a:avLst/>
+          </a:prstGeom>
+          <a:noFill/>
+        </p:spPr>
+        <p:txBody>
+          <a:bodyPr wrap="square" rtlCol="0">
+            <a:spAutoFit/>
+          </a:bodyPr>
+          <a:lstStyle/>
+          <a:p>
+            <a:r>
+              <a:rPr lang="en-US" dirty="0" smtClean="0"/>
+              <a:t>It cannot resist this virus, as the virus has a protein the bacteria doesn’t recognize.</a:t>
+            </a:r>
+            <a:endParaRPr lang="en-US" dirty="0"/>
+          </a:p>
+        </p:txBody>
+      </p:sp>
+      <p:sp>
+        <p:nvSpPr>
+          <p:cNvPr id="9" name="TextBox 8"/>
+          <p:cNvSpPr txBox="1"/>
+          <p:nvPr/>
+        </p:nvSpPr>
+        <p:spPr>
+          <a:xfrm>
+            <a:off x="6523554" y="4627440"/>
+            <a:ext cx="1465966" cy="523220"/>
+          </a:xfrm>
+          <a:prstGeom prst="rect">
+            <a:avLst/>
+          </a:prstGeom>
+          <a:noFill/>
+        </p:spPr>
+        <p:txBody>
+          <a:bodyPr wrap="none" rtlCol="0">
+            <a:spAutoFit/>
+          </a:bodyPr>
+          <a:lstStyle/>
+          <a:p>
+            <a:r>
+              <a:rPr lang="en-US" sz="2800" b="1" dirty="0" smtClean="0">
+                <a:solidFill>
+                  <a:srgbClr val="008000"/>
+                </a:solidFill>
+              </a:rPr>
+              <a:t>0100100</a:t>
+            </a:r>
+            <a:endParaRPr lang="en-US" sz="2800" b="1" dirty="0">
+              <a:solidFill>
+                <a:srgbClr val="008000"/>
+              </a:solidFill>
+            </a:endParaRPr>
+          </a:p>
+        </p:txBody>
+      </p:sp>
+      <p:pic>
+        <p:nvPicPr>
+          <p:cNvPr id="12" name="Picture 11"/>
+          <p:cNvPicPr>
+            <a:picLocks noChangeAspect="1"/>
+          </p:cNvPicPr>
+          <p:nvPr/>
+        </p:nvPicPr>
+        <p:blipFill>
+          <a:blip r:embed="rId2"/>
+          <a:stretch>
+            <a:fillRect/>
+          </a:stretch>
+        </p:blipFill>
+        <p:spPr>
+          <a:xfrm>
+            <a:off x="5928064" y="3494993"/>
+            <a:ext cx="802952" cy="872774"/>
+          </a:xfrm>
+          <a:prstGeom prst="rect">
+            <a:avLst/>
+          </a:prstGeom>
+        </p:spPr>
+      </p:pic>
+      <p:pic>
+        <p:nvPicPr>
+          <p:cNvPr id="13" name="Picture 12"/>
+          <p:cNvPicPr>
+            <a:picLocks noChangeAspect="1"/>
+          </p:cNvPicPr>
+          <p:nvPr/>
+        </p:nvPicPr>
+        <p:blipFill>
+          <a:blip r:embed="rId2"/>
+          <a:stretch>
+            <a:fillRect/>
+          </a:stretch>
+        </p:blipFill>
+        <p:spPr>
+          <a:xfrm>
+            <a:off x="5812405" y="4438876"/>
+            <a:ext cx="802952" cy="872774"/>
+          </a:xfrm>
+          <a:prstGeom prst="rect">
+            <a:avLst/>
+          </a:prstGeom>
+        </p:spPr>
+      </p:pic>
+      <p:pic>
+        <p:nvPicPr>
+          <p:cNvPr id="14" name="Picture 13"/>
+          <p:cNvPicPr>
+            <a:picLocks noChangeAspect="1"/>
+          </p:cNvPicPr>
+          <p:nvPr/>
+        </p:nvPicPr>
+        <p:blipFill>
+          <a:blip r:embed="rId3"/>
+          <a:stretch>
+            <a:fillRect/>
+          </a:stretch>
+        </p:blipFill>
+        <p:spPr>
+          <a:xfrm>
+            <a:off x="1581650" y="2008648"/>
+            <a:ext cx="2029530" cy="1098972"/>
+          </a:xfrm>
+          <a:prstGeom prst="rect">
+            <a:avLst/>
+          </a:prstGeom>
+        </p:spPr>
+      </p:pic>
     </p:spTree>
     <p:extLst>
       <p:ext uri="{BB962C8B-B14F-4D97-AF65-F5344CB8AC3E}">
@@ -5532,6 +6296,80 @@
       </p:grpSpPr>
       <p:sp>
         <p:nvSpPr>
+          <p:cNvPr id="12" name="TextBox 11"/>
+          <p:cNvSpPr txBox="1"/>
+          <p:nvPr/>
+        </p:nvSpPr>
+        <p:spPr>
+          <a:xfrm>
+            <a:off x="685800" y="4398848"/>
+            <a:ext cx="7450403" cy="923330"/>
+          </a:xfrm>
+          <a:prstGeom prst="rect">
+            <a:avLst/>
+          </a:prstGeom>
+          <a:noFill/>
+          <a:ln>
+            <a:solidFill>
+              <a:srgbClr val="000000"/>
+            </a:solidFill>
+          </a:ln>
+        </p:spPr>
+        <p:txBody>
+          <a:bodyPr wrap="square" rtlCol="0">
+            <a:spAutoFit/>
+          </a:bodyPr>
+          <a:lstStyle/>
+          <a:p>
+            <a:endParaRPr lang="en-US" dirty="0" smtClean="0"/>
+          </a:p>
+          <a:p>
+            <a:endParaRPr lang="en-US" dirty="0"/>
+          </a:p>
+          <a:p>
+            <a:endParaRPr lang="en-US" dirty="0"/>
+          </a:p>
+        </p:txBody>
+      </p:sp>
+      <p:sp>
+        <p:nvSpPr>
+          <p:cNvPr id="11" name="TextBox 10"/>
+          <p:cNvSpPr txBox="1"/>
+          <p:nvPr/>
+        </p:nvSpPr>
+        <p:spPr>
+          <a:xfrm>
+            <a:off x="685800" y="3455768"/>
+            <a:ext cx="7450403" cy="923330"/>
+          </a:xfrm>
+          <a:prstGeom prst="rect">
+            <a:avLst/>
+          </a:prstGeom>
+          <a:noFill/>
+          <a:ln>
+            <a:solidFill>
+              <a:srgbClr val="000000"/>
+            </a:solidFill>
+          </a:ln>
+        </p:spPr>
+        <p:txBody>
+          <a:bodyPr wrap="square" rtlCol="0">
+            <a:spAutoFit/>
+          </a:bodyPr>
+          <a:lstStyle/>
+          <a:p>
+            <a:endParaRPr lang="en-US" dirty="0" smtClean="0"/>
+          </a:p>
+          <a:p>
+            <a:endParaRPr lang="en-US" dirty="0"/>
+          </a:p>
+          <a:p>
+            <a:endParaRPr lang="en-US" dirty="0" smtClean="0"/>
+          </a:p>
+        </p:txBody>
+      </p:sp>
+      <p:sp>
+        <p:nvSpPr>
           <p:cNvPr id="2" name="Title 1"/>
           <p:cNvSpPr>
             <a:spLocks noGrp="1"/>
@@ -5547,11 +6385,371 @@
           <a:p>
             <a:r>
               <a:rPr lang="en-US" dirty="0" smtClean="0"/>
-              <a:t>What are we </a:t>
-            </a:r>
+              <a:t>Matching Allele Interaction</a:t>
+            </a:r>
+            <a:endParaRPr lang="en-US" dirty="0"/>
+          </a:p>
+        </p:txBody>
+      </p:sp>
+      <p:sp>
+        <p:nvSpPr>
+          <p:cNvPr id="4" name="Title 1"/>
+          <p:cNvSpPr txBox="1">
+            <a:spLocks/>
+          </p:cNvSpPr>
+          <p:nvPr/>
+        </p:nvSpPr>
+        <p:spPr>
+          <a:xfrm>
+            <a:off x="685800" y="67236"/>
+            <a:ext cx="7770813" cy="1371600"/>
+          </a:xfrm>
+          <a:prstGeom prst="rect">
+            <a:avLst/>
+          </a:prstGeom>
+          <a:effectLst/>
+        </p:spPr>
+        <p:txBody>
+          <a:bodyPr vert="horz" lIns="91440" tIns="45720" rIns="91440" bIns="45720" rtlCol="0" anchor="ctr" anchorCtr="0">
+            <a:noAutofit/>
+          </a:bodyPr>
+          <a:lstStyle>
+            <a:lvl1pPr algn="ctr" defTabSz="914400" rtl="0" eaLnBrk="1" latinLnBrk="0" hangingPunct="1">
+              <a:spcBef>
+                <a:spcPct val="0"/>
+              </a:spcBef>
+              <a:buNone/>
+              <a:defRPr sz="5000" kern="1200">
+                <a:solidFill>
+                  <a:schemeClr val="tx2"/>
+                </a:solidFill>
+                <a:effectLst>
+                  <a:outerShdw blurRad="38100" dist="12700" algn="l" rotWithShape="0">
+                    <a:prstClr val="black">
+                      <a:alpha val="40000"/>
+                    </a:prstClr>
+                  </a:outerShdw>
+                </a:effectLst>
+                <a:latin typeface="+mj-lt"/>
+                <a:ea typeface="+mj-ea"/>
+                <a:cs typeface="+mj-cs"/>
+              </a:defRPr>
+            </a:lvl1pPr>
+          </a:lstStyle>
+          <a:p>
+            <a:endParaRPr lang="en-US" dirty="0"/>
+          </a:p>
+        </p:txBody>
+      </p:sp>
+      <p:sp>
+        <p:nvSpPr>
+          <p:cNvPr id="5" name="Content Placeholder 2"/>
+          <p:cNvSpPr txBox="1">
+            <a:spLocks/>
+          </p:cNvSpPr>
+          <p:nvPr/>
+        </p:nvSpPr>
+        <p:spPr>
+          <a:xfrm>
+            <a:off x="685800" y="3597483"/>
+            <a:ext cx="5449725" cy="546424"/>
+          </a:xfrm>
+          <a:prstGeom prst="rect">
+            <a:avLst/>
+          </a:prstGeom>
+        </p:spPr>
+        <p:txBody>
+          <a:bodyPr vert="horz" lIns="91440" tIns="45720" rIns="91440" bIns="45720" rtlCol="0">
+            <a:noAutofit/>
+          </a:bodyPr>
+          <a:lstStyle>
+            <a:lvl1pPr marL="457200" indent="-457200" algn="l" defTabSz="914400" rtl="0" eaLnBrk="1" latinLnBrk="0" hangingPunct="1">
+              <a:spcBef>
+                <a:spcPts val="2000"/>
+              </a:spcBef>
+              <a:buClr>
+                <a:schemeClr val="accent3"/>
+              </a:buClr>
+              <a:buFont typeface="Wingdings" pitchFamily="2" charset="2"/>
+              <a:buChar char=""/>
+              <a:defRPr sz="2400" kern="1200">
+                <a:solidFill>
+                  <a:schemeClr val="tx2"/>
+                </a:solidFill>
+                <a:latin typeface="+mn-lt"/>
+                <a:ea typeface="+mn-ea"/>
+                <a:cs typeface="+mn-cs"/>
+              </a:defRPr>
+            </a:lvl1pPr>
+            <a:lvl2pPr marL="914400" indent="-457200" algn="l" defTabSz="914400" rtl="0" eaLnBrk="1" latinLnBrk="0" hangingPunct="1">
+              <a:spcBef>
+                <a:spcPts val="600"/>
+              </a:spcBef>
+              <a:buClr>
+                <a:schemeClr val="accent3">
+                  <a:lumMod val="50000"/>
+                </a:schemeClr>
+              </a:buClr>
+              <a:buFont typeface="Wingdings" pitchFamily="2" charset="2"/>
+              <a:buChar char=""/>
+              <a:defRPr sz="2200" kern="1200">
+                <a:solidFill>
+                  <a:schemeClr val="tx2"/>
+                </a:solidFill>
+                <a:latin typeface="+mn-lt"/>
+                <a:ea typeface="+mn-ea"/>
+                <a:cs typeface="+mn-cs"/>
+              </a:defRPr>
+            </a:lvl2pPr>
+            <a:lvl3pPr marL="1371600" indent="-457200" algn="l" defTabSz="914400" rtl="0" eaLnBrk="1" latinLnBrk="0" hangingPunct="1">
+              <a:spcBef>
+                <a:spcPts val="600"/>
+              </a:spcBef>
+              <a:buClr>
+                <a:schemeClr val="accent3"/>
+              </a:buClr>
+              <a:buFont typeface="Wingdings" pitchFamily="2" charset="2"/>
+              <a:buChar char=""/>
+              <a:defRPr sz="2000" kern="1200">
+                <a:solidFill>
+                  <a:schemeClr val="tx2"/>
+                </a:solidFill>
+                <a:latin typeface="+mn-lt"/>
+                <a:ea typeface="+mn-ea"/>
+                <a:cs typeface="+mn-cs"/>
+              </a:defRPr>
+            </a:lvl3pPr>
+            <a:lvl4pPr marL="1828800" indent="-457200" algn="l" defTabSz="914400" rtl="0" eaLnBrk="1" latinLnBrk="0" hangingPunct="1">
+              <a:spcBef>
+                <a:spcPts val="600"/>
+              </a:spcBef>
+              <a:buClr>
+                <a:schemeClr val="accent3">
+                  <a:lumMod val="50000"/>
+                </a:schemeClr>
+              </a:buClr>
+              <a:buFont typeface="Wingdings" pitchFamily="2" charset="2"/>
+              <a:buChar char=""/>
+              <a:defRPr sz="1800" kern="1200">
+                <a:solidFill>
+                  <a:schemeClr val="tx2"/>
+                </a:solidFill>
+                <a:latin typeface="+mn-lt"/>
+                <a:ea typeface="+mn-ea"/>
+                <a:cs typeface="+mn-cs"/>
+              </a:defRPr>
+            </a:lvl4pPr>
+            <a:lvl5pPr marL="2286000" indent="-457200" algn="l" defTabSz="914400" rtl="0" eaLnBrk="1" latinLnBrk="0" hangingPunct="1">
+              <a:spcBef>
+                <a:spcPts val="600"/>
+              </a:spcBef>
+              <a:buClr>
+                <a:schemeClr val="accent3"/>
+              </a:buClr>
+              <a:buFont typeface="Wingdings" pitchFamily="2" charset="2"/>
+              <a:buChar char=""/>
+              <a:defRPr sz="1800" kern="1200">
+                <a:solidFill>
+                  <a:schemeClr val="tx2"/>
+                </a:solidFill>
+                <a:latin typeface="+mn-lt"/>
+                <a:ea typeface="+mn-ea"/>
+                <a:cs typeface="+mn-cs"/>
+              </a:defRPr>
+            </a:lvl5pPr>
+            <a:lvl6pPr marL="2743200" indent="-461963" algn="l" defTabSz="914400" rtl="0" eaLnBrk="1" latinLnBrk="0" hangingPunct="1">
+              <a:spcBef>
+                <a:spcPct val="20000"/>
+              </a:spcBef>
+              <a:buClr>
+                <a:schemeClr val="accent3">
+                  <a:lumMod val="50000"/>
+                </a:schemeClr>
+              </a:buClr>
+              <a:buFont typeface="Wingdings" pitchFamily="2" charset="2"/>
+              <a:buChar char=""/>
+              <a:defRPr sz="1800" kern="1200">
+                <a:solidFill>
+                  <a:schemeClr val="tx1"/>
+                </a:solidFill>
+                <a:latin typeface="+mn-lt"/>
+                <a:ea typeface="+mn-ea"/>
+                <a:cs typeface="+mn-cs"/>
+              </a:defRPr>
+            </a:lvl6pPr>
+            <a:lvl7pPr marL="3205163" indent="-461963" algn="l" defTabSz="914400" rtl="0" eaLnBrk="1" latinLnBrk="0" hangingPunct="1">
+              <a:spcBef>
+                <a:spcPct val="20000"/>
+              </a:spcBef>
+              <a:buClr>
+                <a:schemeClr val="accent3"/>
+              </a:buClr>
+              <a:buFont typeface="Wingdings" pitchFamily="2" charset="2"/>
+              <a:buChar char=""/>
+              <a:defRPr sz="1800" kern="1200">
+                <a:solidFill>
+                  <a:schemeClr val="tx1"/>
+                </a:solidFill>
+                <a:latin typeface="+mn-lt"/>
+                <a:ea typeface="+mn-ea"/>
+                <a:cs typeface="+mn-cs"/>
+              </a:defRPr>
+            </a:lvl7pPr>
+            <a:lvl8pPr marL="3657600" indent="-461963" algn="l" defTabSz="914400" rtl="0" eaLnBrk="1" latinLnBrk="0" hangingPunct="1">
+              <a:spcBef>
+                <a:spcPct val="20000"/>
+              </a:spcBef>
+              <a:buClr>
+                <a:schemeClr val="accent3">
+                  <a:lumMod val="50000"/>
+                </a:schemeClr>
+              </a:buClr>
+              <a:buFont typeface="Wingdings" pitchFamily="2" charset="2"/>
+              <a:buChar char=""/>
+              <a:defRPr sz="1800" kern="1200">
+                <a:solidFill>
+                  <a:schemeClr val="tx1"/>
+                </a:solidFill>
+                <a:latin typeface="+mn-lt"/>
+                <a:ea typeface="+mn-ea"/>
+                <a:cs typeface="+mn-cs"/>
+              </a:defRPr>
+            </a:lvl8pPr>
+            <a:lvl9pPr marL="4119563" indent="-461963" algn="l" defTabSz="914400" rtl="0" eaLnBrk="1" latinLnBrk="0" hangingPunct="1">
+              <a:spcBef>
+                <a:spcPct val="20000"/>
+              </a:spcBef>
+              <a:buClr>
+                <a:schemeClr val="accent3"/>
+              </a:buClr>
+              <a:buFont typeface="Wingdings" pitchFamily="2" charset="2"/>
+              <a:buChar char=""/>
+              <a:defRPr sz="1800" kern="1200">
+                <a:solidFill>
+                  <a:schemeClr val="tx1"/>
+                </a:solidFill>
+                <a:latin typeface="+mn-lt"/>
+                <a:ea typeface="+mn-ea"/>
+                <a:cs typeface="+mn-cs"/>
+              </a:defRPr>
+            </a:lvl9pPr>
+          </a:lstStyle>
+          <a:p>
+            <a:pPr marL="0" indent="0">
+              <a:buFont typeface="Wingdings" pitchFamily="2" charset="2"/>
+              <a:buNone/>
+            </a:pPr>
+            <a:r>
+              <a:rPr lang="en-US" sz="1800" dirty="0" smtClean="0"/>
+              <a:t>The bacteria can resist this virus, because it can detect the difference between itself and the viral genome</a:t>
+            </a:r>
+            <a:endParaRPr lang="en-US" sz="1800" dirty="0"/>
+          </a:p>
+        </p:txBody>
+      </p:sp>
+      <p:sp>
+        <p:nvSpPr>
+          <p:cNvPr id="6" name="TextBox 5"/>
+          <p:cNvSpPr txBox="1"/>
+          <p:nvPr/>
+        </p:nvSpPr>
+        <p:spPr>
+          <a:xfrm>
+            <a:off x="3729310" y="2620561"/>
+            <a:ext cx="1465966" cy="523220"/>
+          </a:xfrm>
+          <a:prstGeom prst="rect">
+            <a:avLst/>
+          </a:prstGeom>
+          <a:noFill/>
+        </p:spPr>
+        <p:txBody>
+          <a:bodyPr wrap="none" rtlCol="0">
+            <a:spAutoFit/>
+          </a:bodyPr>
+          <a:lstStyle/>
+          <a:p>
+            <a:pPr algn="ctr"/>
+            <a:r>
+              <a:rPr lang="en-US" sz="2800" b="1" dirty="0" smtClean="0">
+                <a:solidFill>
+                  <a:srgbClr val="FF0000"/>
+                </a:solidFill>
+              </a:rPr>
+              <a:t>0100011</a:t>
+            </a:r>
+            <a:endParaRPr lang="en-US" sz="2800" b="1" dirty="0">
+              <a:solidFill>
+                <a:srgbClr val="FF0000"/>
+              </a:solidFill>
+            </a:endParaRPr>
+          </a:p>
+        </p:txBody>
+      </p:sp>
+      <p:sp>
+        <p:nvSpPr>
+          <p:cNvPr id="7" name="TextBox 6"/>
+          <p:cNvSpPr txBox="1"/>
+          <p:nvPr/>
+        </p:nvSpPr>
+        <p:spPr>
+          <a:xfrm>
+            <a:off x="6523554" y="3640370"/>
+            <a:ext cx="1465966" cy="523220"/>
+          </a:xfrm>
+          <a:prstGeom prst="rect">
+            <a:avLst/>
+          </a:prstGeom>
+          <a:noFill/>
+        </p:spPr>
+        <p:txBody>
+          <a:bodyPr wrap="none" rtlCol="0">
+            <a:spAutoFit/>
+          </a:bodyPr>
+          <a:lstStyle/>
+          <a:p>
+            <a:r>
+              <a:rPr lang="en-US" sz="2800" b="1" dirty="0" smtClean="0">
+                <a:solidFill>
+                  <a:srgbClr val="008000"/>
+                </a:solidFill>
+              </a:rPr>
+              <a:t>0100001</a:t>
+            </a:r>
+            <a:endParaRPr lang="en-US" sz="2800" b="1" dirty="0">
+              <a:solidFill>
+                <a:srgbClr val="008000"/>
+              </a:solidFill>
+            </a:endParaRPr>
+          </a:p>
+        </p:txBody>
+      </p:sp>
+      <p:sp>
+        <p:nvSpPr>
+          <p:cNvPr id="8" name="TextBox 7"/>
+          <p:cNvSpPr txBox="1"/>
+          <p:nvPr/>
+        </p:nvSpPr>
+        <p:spPr>
+          <a:xfrm>
+            <a:off x="3965570" y="2373468"/>
+            <a:ext cx="1005403" cy="369332"/>
+          </a:xfrm>
+          <a:prstGeom prst="rect">
+            <a:avLst/>
+          </a:prstGeom>
+          <a:noFill/>
+        </p:spPr>
+        <p:txBody>
+          <a:bodyPr wrap="none" rtlCol="0">
+            <a:spAutoFit/>
+          </a:bodyPr>
+          <a:lstStyle/>
+          <a:p>
+            <a:pPr algn="ctr"/>
             <a:r>
               <a:rPr lang="en-US" dirty="0" smtClean="0"/>
-              <a:t>doing?</a:t>
+              <a:t>Bacteria</a:t>
             </a:r>
             <a:endParaRPr lang="en-US" dirty="0"/>
           </a:p>
@@ -5559,90 +6757,94 @@
       </p:sp>
       <p:sp>
         <p:nvSpPr>
-          <p:cNvPr id="3" name="Content Placeholder 2"/>
-          <p:cNvSpPr>
-            <a:spLocks noGrp="1"/>
-          </p:cNvSpPr>
-          <p:nvPr>
-            <p:ph idx="1"/>
-          </p:nvPr>
+          <p:cNvPr id="9" name="TextBox 8"/>
+          <p:cNvSpPr txBox="1"/>
+          <p:nvPr/>
         </p:nvSpPr>
         <p:spPr>
           <a:xfrm>
-            <a:off x="685800" y="1958414"/>
-            <a:ext cx="8047399" cy="4826994"/>
-          </a:xfrm>
-        </p:spPr>
-        <p:txBody>
-          <a:bodyPr>
-            <a:normAutofit/>
+            <a:off x="719013" y="4539285"/>
+            <a:ext cx="5218407" cy="646331"/>
+          </a:xfrm>
+          <a:prstGeom prst="rect">
+            <a:avLst/>
+          </a:prstGeom>
+          <a:noFill/>
+        </p:spPr>
+        <p:txBody>
+          <a:bodyPr wrap="square" rtlCol="0">
+            <a:spAutoFit/>
           </a:bodyPr>
           <a:lstStyle/>
           <a:p>
             <a:r>
               <a:rPr lang="en-US" dirty="0" smtClean="0"/>
-              <a:t>Replicating and </a:t>
-            </a:r>
-            <a:r>
-              <a:rPr lang="en-US" dirty="0"/>
-              <a:t>i</a:t>
+              <a:t>It cannot resist this virus, as the virus </a:t>
             </a:r>
             <a:r>
               <a:rPr lang="en-US" dirty="0" smtClean="0"/>
-              <a:t>mproving on this paper</a:t>
-            </a:r>
-          </a:p>
-          <a:p>
+              <a:t>matches the host recognition sequence perfectly.</a:t>
+            </a:r>
             <a:endParaRPr lang="en-US" dirty="0"/>
           </a:p>
-          <a:p>
-            <a:endParaRPr lang="en-US" dirty="0" smtClean="0"/>
-          </a:p>
-          <a:p>
-            <a:endParaRPr lang="en-US" dirty="0"/>
-          </a:p>
-          <a:p>
-            <a:endParaRPr lang="en-US" dirty="0" smtClean="0"/>
-          </a:p>
-          <a:p>
-            <a:r>
-              <a:rPr lang="en-US" dirty="0" smtClean="0"/>
-              <a:t>Used a GA to simulate evolution of mutation rates in hosts</a:t>
-            </a:r>
-          </a:p>
-          <a:p>
-            <a:r>
-              <a:rPr lang="en-US" dirty="0" smtClean="0"/>
-              <a:t>Explored further and confirmed using wet lab methods</a:t>
-            </a:r>
-            <a:endParaRPr lang="en-US" dirty="0"/>
+        </p:txBody>
+      </p:sp>
+      <p:sp>
+        <p:nvSpPr>
+          <p:cNvPr id="10" name="TextBox 9"/>
+          <p:cNvSpPr txBox="1"/>
+          <p:nvPr/>
+        </p:nvSpPr>
+        <p:spPr>
+          <a:xfrm>
+            <a:off x="6523554" y="4627440"/>
+            <a:ext cx="1463862" cy="523220"/>
+          </a:xfrm>
+          <a:prstGeom prst="rect">
+            <a:avLst/>
+          </a:prstGeom>
+          <a:noFill/>
+        </p:spPr>
+        <p:txBody>
+          <a:bodyPr wrap="none" rtlCol="0">
+            <a:spAutoFit/>
+          </a:bodyPr>
+          <a:lstStyle/>
+          <a:p>
+            <a:r>
+              <a:rPr lang="en-US" sz="2800" b="1" dirty="0" smtClean="0">
+                <a:solidFill>
+                  <a:srgbClr val="008000"/>
+                </a:solidFill>
+              </a:rPr>
+              <a:t>0100011</a:t>
+            </a:r>
+            <a:endParaRPr lang="en-US" sz="2800" b="1" dirty="0">
+              <a:solidFill>
+                <a:srgbClr val="008000"/>
+              </a:solidFill>
+            </a:endParaRPr>
           </a:p>
         </p:txBody>
       </p:sp>
       <p:pic>
         <p:nvPicPr>
-          <p:cNvPr id="5" name="Picture 4" descr="Screen Shot 2015-06-04 at 1.58.33 PM.png"/>
+          <p:cNvPr id="14" name="Picture 13"/>
           <p:cNvPicPr>
             <a:picLocks noChangeAspect="1"/>
           </p:cNvPicPr>
           <p:nvPr/>
         </p:nvPicPr>
         <p:blipFill>
-          <a:blip r:embed="rId2">
-            <a:extLst>
-              <a:ext uri="{28A0092B-C50C-407E-A947-70E740481C1C}">
-                <a14:useLocalDpi xmlns:a14="http://schemas.microsoft.com/office/drawing/2010/main" val="0"/>
-              </a:ext>
-            </a:extLst>
-          </a:blip>
+          <a:blip r:embed="rId2"/>
           <a:stretch>
             <a:fillRect/>
           </a:stretch>
         </p:blipFill>
         <p:spPr>
           <a:xfrm>
-            <a:off x="0" y="2540000"/>
-            <a:ext cx="9144000" cy="1540144"/>
+            <a:off x="1581650" y="2008648"/>
+            <a:ext cx="2029530" cy="1098972"/>
           </a:xfrm>
           <a:prstGeom prst="rect">
             <a:avLst/>
@@ -5651,34 +6853,167 @@
       </p:pic>
       <p:pic>
         <p:nvPicPr>
-          <p:cNvPr id="6" name="Picture 5" descr="Screen Shot 2015-06-04 at 1.58.19 PM.png"/>
+          <p:cNvPr id="15" name="Picture 14"/>
           <p:cNvPicPr>
             <a:picLocks noChangeAspect="1"/>
           </p:cNvPicPr>
           <p:nvPr/>
         </p:nvPicPr>
         <p:blipFill>
-          <a:blip r:embed="rId3">
-            <a:extLst>
-              <a:ext uri="{28A0092B-C50C-407E-A947-70E740481C1C}">
-                <a14:useLocalDpi xmlns:a14="http://schemas.microsoft.com/office/drawing/2010/main" val="0"/>
-              </a:ext>
-            </a:extLst>
-          </a:blip>
+          <a:blip r:embed="rId3"/>
           <a:stretch>
             <a:fillRect/>
           </a:stretch>
         </p:blipFill>
         <p:spPr>
           <a:xfrm>
-            <a:off x="0" y="3977399"/>
-            <a:ext cx="9144000" cy="877214"/>
+            <a:off x="5928064" y="3494993"/>
+            <a:ext cx="802952" cy="872774"/>
           </a:xfrm>
           <a:prstGeom prst="rect">
             <a:avLst/>
           </a:prstGeom>
         </p:spPr>
       </p:pic>
+      <p:pic>
+        <p:nvPicPr>
+          <p:cNvPr id="16" name="Picture 15"/>
+          <p:cNvPicPr>
+            <a:picLocks noChangeAspect="1"/>
+          </p:cNvPicPr>
+          <p:nvPr/>
+        </p:nvPicPr>
+        <p:blipFill>
+          <a:blip r:embed="rId3"/>
+          <a:stretch>
+            <a:fillRect/>
+          </a:stretch>
+        </p:blipFill>
+        <p:spPr>
+          <a:xfrm>
+            <a:off x="5832383" y="4449404"/>
+            <a:ext cx="802952" cy="872774"/>
+          </a:xfrm>
+          <a:prstGeom prst="rect">
+            <a:avLst/>
+          </a:prstGeom>
+        </p:spPr>
+      </p:pic>
+    </p:spTree>
+    <p:extLst>
+      <p:ext uri="{BB962C8B-B14F-4D97-AF65-F5344CB8AC3E}">
+        <p14:creationId xmlns:p14="http://schemas.microsoft.com/office/powerpoint/2010/main" val="1388171485"/>
+      </p:ext>
+    </p:extLst>
+  </p:cSld>
+  <p:clrMapOvr>
+    <a:masterClrMapping/>
+  </p:clrMapOvr>
+</p:sld>
+</file>
+
+<file path=ppt/slides/slide7.xml><?xml version="1.0" encoding="utf-8"?>
+<p:sld xmlns:a="http://schemas.openxmlformats.org/drawingml/2006/main" xmlns:r="http://schemas.openxmlformats.org/officeDocument/2006/relationships" xmlns:p="http://schemas.openxmlformats.org/presentationml/2006/main">
+  <p:cSld>
+    <p:spTree>
+      <p:nvGrpSpPr>
+        <p:cNvPr id="1" name=""/>
+        <p:cNvGrpSpPr/>
+        <p:nvPr/>
+      </p:nvGrpSpPr>
+      <p:grpSpPr>
+        <a:xfrm>
+          <a:off x="0" y="0"/>
+          <a:ext cx="0" cy="0"/>
+          <a:chOff x="0" y="0"/>
+          <a:chExt cx="0" cy="0"/>
+        </a:xfrm>
+      </p:grpSpPr>
+      <p:sp>
+        <p:nvSpPr>
+          <p:cNvPr id="2" name="Title 1"/>
+          <p:cNvSpPr>
+            <a:spLocks noGrp="1"/>
+          </p:cNvSpPr>
+          <p:nvPr>
+            <p:ph type="title"/>
+          </p:nvPr>
+        </p:nvSpPr>
+        <p:spPr/>
+        <p:txBody>
+          <a:bodyPr/>
+          <a:lstStyle/>
+          <a:p>
+            <a:r>
+              <a:rPr lang="en-US" dirty="0" smtClean="0"/>
+              <a:t>What are we doing?</a:t>
+            </a:r>
+            <a:endParaRPr lang="en-US" dirty="0"/>
+          </a:p>
+        </p:txBody>
+      </p:sp>
+      <p:sp>
+        <p:nvSpPr>
+          <p:cNvPr id="3" name="Content Placeholder 2"/>
+          <p:cNvSpPr>
+            <a:spLocks noGrp="1"/>
+          </p:cNvSpPr>
+          <p:nvPr>
+            <p:ph idx="1"/>
+          </p:nvPr>
+        </p:nvSpPr>
+        <p:spPr>
+          <a:xfrm>
+            <a:off x="685800" y="1958414"/>
+            <a:ext cx="8047399" cy="4826994"/>
+          </a:xfrm>
+        </p:spPr>
+        <p:txBody>
+          <a:bodyPr>
+            <a:normAutofit/>
+          </a:bodyPr>
+          <a:lstStyle/>
+          <a:p>
+            <a:r>
+              <a:rPr lang="en-US" dirty="0" smtClean="0"/>
+              <a:t>Replicating and </a:t>
+            </a:r>
+            <a:r>
+              <a:rPr lang="en-US" dirty="0"/>
+              <a:t>i</a:t>
+            </a:r>
+            <a:r>
+              <a:rPr lang="en-US" dirty="0" smtClean="0"/>
+              <a:t>mproving on this paper</a:t>
+            </a:r>
+          </a:p>
+          <a:p>
+            <a:endParaRPr lang="en-US" dirty="0"/>
+          </a:p>
+          <a:p>
+            <a:endParaRPr lang="en-US" dirty="0" smtClean="0"/>
+          </a:p>
+          <a:p>
+            <a:endParaRPr lang="en-US" dirty="0"/>
+          </a:p>
+          <a:p>
+            <a:endParaRPr lang="en-US" dirty="0" smtClean="0"/>
+          </a:p>
+          <a:p>
+            <a:r>
+              <a:rPr lang="en-US" dirty="0" smtClean="0"/>
+              <a:t>Used a GA to simulate evolution of mutation rates in hosts</a:t>
+            </a:r>
+          </a:p>
+          <a:p>
+            <a:r>
+              <a:rPr lang="en-US" dirty="0" smtClean="0"/>
+              <a:t>Explored further and confirmed using wet lab methods</a:t>
+            </a:r>
+            <a:endParaRPr lang="en-US" dirty="0"/>
+          </a:p>
+        </p:txBody>
+      </p:sp>
       <p:sp>
         <p:nvSpPr>
           <p:cNvPr id="7" name="TextBox 6"/>
@@ -5708,6 +7043,113 @@
               <a:t>    </a:t>
             </a:r>
             <a:endParaRPr lang="en-US" dirty="0"/>
+          </a:p>
+        </p:txBody>
+      </p:sp>
+      <p:sp>
+        <p:nvSpPr>
+          <p:cNvPr id="4" name="Rectangle 3"/>
+          <p:cNvSpPr/>
+          <p:nvPr/>
+        </p:nvSpPr>
+        <p:spPr>
+          <a:xfrm>
+            <a:off x="0" y="3977399"/>
+            <a:ext cx="9144000" cy="877214"/>
+          </a:xfrm>
+          <a:prstGeom prst="rect">
+            <a:avLst/>
+          </a:prstGeom>
+          <a:blipFill dpi="0" rotWithShape="1">
+            <a:blip r:embed="rId2">
+              <a:alphaModFix amt="81000"/>
+            </a:blip>
+            <a:srcRect/>
+            <a:stretch>
+              <a:fillRect/>
+            </a:stretch>
+          </a:blipFill>
+          <a:ln>
+            <a:noFill/>
+          </a:ln>
+        </p:spPr>
+        <p:style>
+          <a:lnRef idx="1">
+            <a:schemeClr val="accent1"/>
+          </a:lnRef>
+          <a:fillRef idx="3">
+            <a:schemeClr val="accent1"/>
+          </a:fillRef>
+          <a:effectRef idx="2">
+            <a:schemeClr val="accent1"/>
+          </a:effectRef>
+          <a:fontRef idx="minor">
+            <a:schemeClr val="lt1"/>
+          </a:fontRef>
+        </p:style>
+        <p:txBody>
+          <a:bodyPr rtlCol="0" anchor="ctr"/>
+          <a:lstStyle/>
+          <a:p>
+            <a:pPr algn="ctr"/>
+            <a:endParaRPr lang="en-US"/>
+          </a:p>
+        </p:txBody>
+      </p:sp>
+      <p:sp>
+        <p:nvSpPr>
+          <p:cNvPr id="12" name="Rectangle 11"/>
+          <p:cNvSpPr/>
+          <p:nvPr/>
+        </p:nvSpPr>
+        <p:spPr>
+          <a:xfrm>
+            <a:off x="0" y="2472556"/>
+            <a:ext cx="9144000" cy="1519949"/>
+          </a:xfrm>
+          <a:prstGeom prst="rect">
+            <a:avLst/>
+          </a:prstGeom>
+          <a:blipFill dpi="0" rotWithShape="1">
+            <a:blip r:embed="rId3">
+              <a:alphaModFix amt="80000"/>
+            </a:blip>
+            <a:srcRect/>
+            <a:stretch>
+              <a:fillRect/>
+            </a:stretch>
+          </a:blipFill>
+          <a:ln>
+            <a:noFill/>
+          </a:ln>
+          <a:effectLst>
+            <a:outerShdw blurRad="38100" dir="5400000" algn="br" rotWithShape="0">
+              <a:schemeClr val="tx1">
+                <a:alpha val="50000"/>
+              </a:schemeClr>
+            </a:outerShdw>
+          </a:effectLst>
+        </p:spPr>
+        <p:style>
+          <a:lnRef idx="1">
+            <a:schemeClr val="accent1"/>
+          </a:lnRef>
+          <a:fillRef idx="3">
+            <a:schemeClr val="accent1"/>
+          </a:fillRef>
+          <a:effectRef idx="2">
+            <a:schemeClr val="accent1"/>
+          </a:effectRef>
+          <a:fontRef idx="minor">
+            <a:schemeClr val="lt1"/>
+          </a:fontRef>
+        </p:style>
+        <p:txBody>
+          <a:bodyPr rtlCol="0" anchor="ctr"/>
+          <a:lstStyle/>
+          <a:p>
+            <a:pPr algn="ctr"/>
+            <a:endParaRPr lang="en-US"/>
           </a:p>
         </p:txBody>
       </p:sp>
@@ -5724,7 +7166,7 @@
 </p:sld>
 </file>
 
-<file path=ppt/slides/slide7.xml><?xml version="1.0" encoding="utf-8"?>
+<file path=ppt/slides/slide8.xml><?xml version="1.0" encoding="utf-8"?>
 <p:sld xmlns:a="http://schemas.openxmlformats.org/drawingml/2006/main" xmlns:r="http://schemas.openxmlformats.org/officeDocument/2006/relationships" xmlns:p="http://schemas.openxmlformats.org/presentationml/2006/main">
   <p:cSld>
     <p:spTree>
@@ -6054,7 +7496,7 @@
 </p:sld>
 </file>
 
-<file path=ppt/slides/slide8.xml><?xml version="1.0" encoding="utf-8"?>
+<file path=ppt/slides/slide9.xml><?xml version="1.0" encoding="utf-8"?>
 <p:sld xmlns:a="http://schemas.openxmlformats.org/drawingml/2006/main" xmlns:r="http://schemas.openxmlformats.org/officeDocument/2006/relationships" xmlns:p="http://schemas.openxmlformats.org/presentationml/2006/main">
   <p:cSld>
     <p:spTree>
@@ -6111,15 +7553,7 @@
           <a:p>
             <a:r>
               <a:rPr lang="en-US" dirty="0" smtClean="0"/>
-              <a:t>Implemented a </a:t>
-            </a:r>
-            <a:r>
-              <a:rPr lang="en-US" dirty="0" smtClean="0"/>
-              <a:t>coevolution </a:t>
-            </a:r>
-            <a:r>
-              <a:rPr lang="en-US" dirty="0" smtClean="0"/>
-              <a:t>GA using the Gene-for-gene interaction model</a:t>
+              <a:t>Implemented a coevolution GA using the Gene-for-gene interaction model</a:t>
             </a:r>
             <a:endParaRPr lang="en-US" dirty="0"/>
           </a:p>
@@ -6159,106 +7593,6 @@
     <p:extLst>
       <p:ext uri="{BB962C8B-B14F-4D97-AF65-F5344CB8AC3E}">
         <p14:creationId xmlns:p14="http://schemas.microsoft.com/office/powerpoint/2010/main" val="4093501149"/>
-      </p:ext>
-    </p:extLst>
-  </p:cSld>
-  <p:clrMapOvr>
-    <a:masterClrMapping/>
-  </p:clrMapOvr>
-</p:sld>
-</file>
-
-<file path=ppt/slides/slide9.xml><?xml version="1.0" encoding="utf-8"?>
-<p:sld xmlns:a="http://schemas.openxmlformats.org/drawingml/2006/main" xmlns:r="http://schemas.openxmlformats.org/officeDocument/2006/relationships" xmlns:p="http://schemas.openxmlformats.org/presentationml/2006/main">
-  <p:cSld>
-    <p:spTree>
-      <p:nvGrpSpPr>
-        <p:cNvPr id="1" name=""/>
-        <p:cNvGrpSpPr/>
-        <p:nvPr/>
-      </p:nvGrpSpPr>
-      <p:grpSpPr>
-        <a:xfrm>
-          <a:off x="0" y="0"/>
-          <a:ext cx="0" cy="0"/>
-          <a:chOff x="0" y="0"/>
-          <a:chExt cx="0" cy="0"/>
-        </a:xfrm>
-      </p:grpSpPr>
-      <p:sp>
-        <p:nvSpPr>
-          <p:cNvPr id="2" name="Title 1"/>
-          <p:cNvSpPr>
-            <a:spLocks noGrp="1"/>
-          </p:cNvSpPr>
-          <p:nvPr>
-            <p:ph type="title"/>
-          </p:nvPr>
-        </p:nvSpPr>
-        <p:spPr/>
-        <p:txBody>
-          <a:bodyPr/>
-          <a:lstStyle/>
-          <a:p>
-            <a:r>
-              <a:rPr lang="en-US" dirty="0" smtClean="0"/>
-              <a:t>How does it work?</a:t>
-            </a:r>
-            <a:endParaRPr lang="en-US" dirty="0"/>
-          </a:p>
-        </p:txBody>
-      </p:sp>
-      <p:sp>
-        <p:nvSpPr>
-          <p:cNvPr id="3" name="Content Placeholder 2"/>
-          <p:cNvSpPr>
-            <a:spLocks noGrp="1"/>
-          </p:cNvSpPr>
-          <p:nvPr>
-            <p:ph idx="1"/>
-          </p:nvPr>
-        </p:nvSpPr>
-        <p:spPr/>
-        <p:txBody>
-          <a:bodyPr/>
-          <a:lstStyle/>
-          <a:p>
-            <a:r>
-              <a:rPr lang="en-US" dirty="0" smtClean="0"/>
-              <a:t>Representation?</a:t>
-            </a:r>
-          </a:p>
-          <a:p>
-            <a:r>
-              <a:rPr lang="en-US" dirty="0" smtClean="0"/>
-              <a:t>No crossover (both reproduce asexually in nature)</a:t>
-            </a:r>
-          </a:p>
-          <a:p>
-            <a:r>
-              <a:rPr lang="en-US" dirty="0" smtClean="0"/>
-              <a:t>Mutation rate?</a:t>
-            </a:r>
-          </a:p>
-          <a:p>
-            <a:r>
-              <a:rPr lang="en-US" dirty="0" smtClean="0"/>
-              <a:t>Fitness functions?</a:t>
-            </a:r>
-          </a:p>
-          <a:p>
-            <a:r>
-              <a:rPr lang="en-US" dirty="0" smtClean="0"/>
-              <a:t>Selection?</a:t>
-            </a:r>
-            <a:endParaRPr lang="en-US" dirty="0"/>
-          </a:p>
-        </p:txBody>
-      </p:sp>
-    </p:spTree>
-    <p:extLst>
-      <p:ext uri="{BB962C8B-B14F-4D97-AF65-F5344CB8AC3E}">
-        <p14:creationId xmlns:p14="http://schemas.microsoft.com/office/powerpoint/2010/main" val="615378970"/>
       </p:ext>
     </p:extLst>
   </p:cSld>

</xml_diff>

<commit_message>
table in writeup, edits in ppt, comments in code
</commit_message>
<xml_diff>
--- a/presentation.pptx
+++ b/presentation.pptx
@@ -121,7 +121,7 @@
   </p:defaultTextStyle>
   <p:extLst>
     <p:ext uri="{EFAFB233-063F-42B5-8137-9DF3F51BA10A}">
-      <p15:sldGuideLst xmlns:p15="http://schemas.microsoft.com/office/powerpoint/2012/main">
+      <p15:sldGuideLst xmlns:p15="http://schemas.microsoft.com/office/powerpoint/2012/main" xmlns="">
         <p15:guide id="1" orient="horz" pos="2160">
           <p15:clr>
             <a:srgbClr val="A4A3A4"/>
@@ -220,7 +220,7 @@
           <a:p>
             <a:fld id="{44201544-D0D1-5B41-A16A-F722EC0150C2}" type="datetimeFigureOut">
               <a:rPr lang="en-US" smtClean="0"/>
-              <a:t>6/5/2015</a:t>
+              <a:t>6/5/15</a:t>
             </a:fld>
             <a:endParaRPr lang="en-US"/>
           </a:p>
@@ -851,7 +851,7 @@
           <a:p>
             <a:fld id="{1778F24D-EB19-4AE0-B015-2BEA6D5224F2}" type="datetimeFigureOut">
               <a:rPr lang="en-US" smtClean="0"/>
-              <a:t>6/5/2015</a:t>
+              <a:t>6/5/15</a:t>
             </a:fld>
             <a:endParaRPr lang="en-US"/>
           </a:p>
@@ -1164,7 +1164,7 @@
           <a:p>
             <a:fld id="{1778F24D-EB19-4AE0-B015-2BEA6D5224F2}" type="datetimeFigureOut">
               <a:rPr lang="en-US" smtClean="0"/>
-              <a:t>6/5/2015</a:t>
+              <a:t>6/5/15</a:t>
             </a:fld>
             <a:endParaRPr lang="en-US"/>
           </a:p>
@@ -1371,7 +1371,7 @@
           <a:p>
             <a:fld id="{1778F24D-EB19-4AE0-B015-2BEA6D5224F2}" type="datetimeFigureOut">
               <a:rPr lang="en-US" smtClean="0"/>
-              <a:t>6/5/2015</a:t>
+              <a:t>6/5/15</a:t>
             </a:fld>
             <a:endParaRPr lang="en-US"/>
           </a:p>
@@ -1576,7 +1576,7 @@
           <a:p>
             <a:fld id="{1778F24D-EB19-4AE0-B015-2BEA6D5224F2}" type="datetimeFigureOut">
               <a:rPr lang="en-US" smtClean="0"/>
-              <a:t>6/5/2015</a:t>
+              <a:t>6/5/15</a:t>
             </a:fld>
             <a:endParaRPr lang="en-US"/>
           </a:p>
@@ -1771,7 +1771,7 @@
           <a:p>
             <a:fld id="{1778F24D-EB19-4AE0-B015-2BEA6D5224F2}" type="datetimeFigureOut">
               <a:rPr lang="en-US" smtClean="0"/>
-              <a:t>6/5/2015</a:t>
+              <a:t>6/5/15</a:t>
             </a:fld>
             <a:endParaRPr lang="en-US"/>
           </a:p>
@@ -2041,7 +2041,7 @@
           <a:p>
             <a:fld id="{1778F24D-EB19-4AE0-B015-2BEA6D5224F2}" type="datetimeFigureOut">
               <a:rPr lang="en-US" smtClean="0"/>
-              <a:t>6/5/2015</a:t>
+              <a:t>6/5/15</a:t>
             </a:fld>
             <a:endParaRPr lang="en-US"/>
           </a:p>
@@ -2352,7 +2352,7 @@
           <a:p>
             <a:fld id="{1778F24D-EB19-4AE0-B015-2BEA6D5224F2}" type="datetimeFigureOut">
               <a:rPr lang="en-US" smtClean="0"/>
-              <a:t>6/5/2015</a:t>
+              <a:t>6/5/15</a:t>
             </a:fld>
             <a:endParaRPr lang="en-US"/>
           </a:p>
@@ -2813,7 +2813,7 @@
           <a:p>
             <a:fld id="{1778F24D-EB19-4AE0-B015-2BEA6D5224F2}" type="datetimeFigureOut">
               <a:rPr lang="en-US" smtClean="0"/>
-              <a:t>6/5/2015</a:t>
+              <a:t>6/5/15</a:t>
             </a:fld>
             <a:endParaRPr lang="en-US"/>
           </a:p>
@@ -2952,7 +2952,7 @@
           <a:p>
             <a:fld id="{1778F24D-EB19-4AE0-B015-2BEA6D5224F2}" type="datetimeFigureOut">
               <a:rPr lang="en-US" smtClean="0"/>
-              <a:t>6/5/2015</a:t>
+              <a:t>6/5/15</a:t>
             </a:fld>
             <a:endParaRPr lang="en-US"/>
           </a:p>
@@ -3068,7 +3068,7 @@
           <a:p>
             <a:fld id="{1778F24D-EB19-4AE0-B015-2BEA6D5224F2}" type="datetimeFigureOut">
               <a:rPr lang="en-US" smtClean="0"/>
-              <a:t>6/5/2015</a:t>
+              <a:t>6/5/15</a:t>
             </a:fld>
             <a:endParaRPr lang="en-US"/>
           </a:p>
@@ -3354,7 +3354,7 @@
           <a:p>
             <a:fld id="{1778F24D-EB19-4AE0-B015-2BEA6D5224F2}" type="datetimeFigureOut">
               <a:rPr lang="en-US" smtClean="0"/>
-              <a:t>6/5/2015</a:t>
+              <a:t>6/5/15</a:t>
             </a:fld>
             <a:endParaRPr lang="en-US"/>
           </a:p>
@@ -3692,7 +3692,7 @@
           <a:p>
             <a:fld id="{1778F24D-EB19-4AE0-B015-2BEA6D5224F2}" type="datetimeFigureOut">
               <a:rPr lang="en-US" smtClean="0"/>
-              <a:t>6/5/2015</a:t>
+              <a:t>6/5/15</a:t>
             </a:fld>
             <a:endParaRPr lang="en-US"/>
           </a:p>
@@ -3968,7 +3968,7 @@
           <a:p>
             <a:fld id="{1778F24D-EB19-4AE0-B015-2BEA6D5224F2}" type="datetimeFigureOut">
               <a:rPr lang="en-US" smtClean="0"/>
-              <a:t>6/5/2015</a:t>
+              <a:t>6/5/15</a:t>
             </a:fld>
             <a:endParaRPr lang="en-US"/>
           </a:p>
@@ -4689,14 +4689,14 @@
           <p:nvPr>
             <p:extLst>
               <p:ext uri="{D42A27DB-BD31-4B8C-83A1-F6EECF244321}">
-                <p14:modId xmlns:p14="http://schemas.microsoft.com/office/powerpoint/2010/main" val="167514128"/>
+                <p14:modId xmlns:p14="http://schemas.microsoft.com/office/powerpoint/2010/main" val="1279833664"/>
               </p:ext>
             </p:extLst>
           </p:nvPr>
         </p:nvGraphicFramePr>
         <p:xfrm>
           <a:off x="1668776" y="3256280"/>
-          <a:ext cx="6328416" cy="370840"/>
+          <a:ext cx="4218944" cy="370840"/>
         </p:xfrm>
         <a:graphic>
           <a:graphicData uri="http://schemas.openxmlformats.org/drawingml/2006/table">
@@ -4705,7 +4705,6 @@
                 <a:tableStyleId>{5C22544A-7EE6-4342-B048-85BDC9FD1C3A}</a:tableStyleId>
               </a:tblPr>
               <a:tblGrid>
-                <a:gridCol w="2109472"/>
                 <a:gridCol w="2109472"/>
                 <a:gridCol w="527368"/>
                 <a:gridCol w="527368"/>
@@ -4726,24 +4725,6 @@
                     </a:p>
                   </a:txBody>
                   <a:tcPr/>
-                </a:tc>
-                <a:tc>
-                  <a:txBody>
-                    <a:bodyPr/>
-                    <a:lstStyle/>
-                    <a:p>
-                      <a:r>
-                        <a:rPr lang="en-US" dirty="0" smtClean="0"/>
-                        <a:t>Mutation Rate</a:t>
-                      </a:r>
-                      <a:endParaRPr lang="en-US" dirty="0"/>
-                    </a:p>
-                  </a:txBody>
-                  <a:tcPr>
-                    <a:solidFill>
-                      <a:schemeClr val="accent6"/>
-                    </a:solidFill>
-                  </a:tcPr>
                 </a:tc>
                 <a:tc>
                   <a:txBody>
@@ -4814,7 +4795,7 @@
         </p:nvSpPr>
         <p:spPr>
           <a:xfrm>
-            <a:off x="5977890" y="3251200"/>
+            <a:off x="4221938" y="3256280"/>
             <a:ext cx="2019300" cy="370840"/>
           </a:xfrm>
           <a:prstGeom prst="rect">
@@ -4853,7 +4834,7 @@
           <p:nvPr>
             <p:extLst>
               <p:ext uri="{D42A27DB-BD31-4B8C-83A1-F6EECF244321}">
-                <p14:modId xmlns:p14="http://schemas.microsoft.com/office/powerpoint/2010/main" val="3038073654"/>
+                <p14:modId xmlns:p14="http://schemas.microsoft.com/office/powerpoint/2010/main" val="121496959"/>
               </p:ext>
             </p:extLst>
           </p:nvPr>
@@ -4901,8 +4882,8 @@
                     <a:lstStyle/>
                     <a:p>
                       <a:r>
-                        <a:rPr lang="en-US" dirty="0" smtClean="0"/>
-                        <a:t>Mutation Rate</a:t>
+                        <a:rPr lang="en-US" dirty="0" err="1" smtClean="0"/>
+                        <a:t>Mutator</a:t>
                       </a:r>
                       <a:endParaRPr lang="en-US" dirty="0"/>
                     </a:p>
@@ -5198,11 +5179,7 @@
           <a:p>
             <a:r>
               <a:rPr lang="en-US" dirty="0" smtClean="0"/>
-              <a:t>No </a:t>
-            </a:r>
-            <a:r>
-              <a:rPr lang="en-US" dirty="0" smtClean="0"/>
-              <a:t>crossover (both reproduce asexually in nature)</a:t>
+              <a:t>No crossover (both reproduce asexually in nature)</a:t>
             </a:r>
           </a:p>
           <a:p>
@@ -6779,11 +6756,7 @@
           <a:p>
             <a:r>
               <a:rPr lang="en-US" dirty="0" smtClean="0"/>
-              <a:t>It cannot resist this virus, as the virus </a:t>
-            </a:r>
-            <a:r>
-              <a:rPr lang="en-US" dirty="0" smtClean="0"/>
-              <a:t>matches the host recognition sequence perfectly.</a:t>
+              <a:t>It cannot resist this virus, as the virus matches the host recognition sequence perfectly.</a:t>
             </a:r>
             <a:endParaRPr lang="en-US" dirty="0"/>
           </a:p>

</xml_diff>